<commit_message>
updated slides for m1
</commit_message>
<xml_diff>
--- a/meetings/2019_11_04_basic_papers/2019_11_04_basic_papers_v2.pptx
+++ b/meetings/2019_11_04_basic_papers/2019_11_04_basic_papers_v2.pptx
@@ -5,10 +5,10 @@
     <p:sldMasterId id="2147483648" r:id="rId1"/>
   </p:sldMasterIdLst>
   <p:notesMasterIdLst>
-    <p:notesMasterId r:id="rId16"/>
+    <p:notesMasterId r:id="rId17"/>
   </p:notesMasterIdLst>
   <p:handoutMasterIdLst>
-    <p:handoutMasterId r:id="rId17"/>
+    <p:handoutMasterId r:id="rId18"/>
   </p:handoutMasterIdLst>
   <p:sldIdLst>
     <p:sldId id="256" r:id="rId3"/>
@@ -20,10 +20,11 @@
     <p:sldId id="260" r:id="rId9"/>
     <p:sldId id="261" r:id="rId10"/>
     <p:sldId id="271" r:id="rId11"/>
-    <p:sldId id="273" r:id="rId12"/>
+    <p:sldId id="277" r:id="rId12"/>
     <p:sldId id="272" r:id="rId13"/>
-    <p:sldId id="262" r:id="rId14"/>
-    <p:sldId id="263" r:id="rId15"/>
+    <p:sldId id="273" r:id="rId14"/>
+    <p:sldId id="262" r:id="rId15"/>
+    <p:sldId id="263" r:id="rId16"/>
   </p:sldIdLst>
   <p:sldSz cx="9144000" cy="6858000" type="screen4x3"/>
   <p:notesSz cx="6858000" cy="9144000"/>
@@ -3835,14 +3836,14 @@
           <a:p>
             <a:r>
               <a:rPr lang="en-US"/>
-              <a:t>m1_1</a:t>
+              <a:t>m1_1 </a:t>
             </a:r>
             <a:br>
               <a:rPr lang="en-US"/>
             </a:br>
             <a:r>
               <a:rPr lang="en-US"/>
-              <a:t>lost function</a:t>
+              <a:t>related literature</a:t>
             </a:r>
             <a:endParaRPr lang="en-US"/>
           </a:p>
@@ -3863,7 +3864,83 @@
           <a:bodyPr/>
           <a:lstStyle/>
           <a:p>
-            <a:endParaRPr lang="en-US"/>
+            <a:pPr marL="342900" indent="-342900">
+              <a:buFont typeface="Arial" panose="020B0604020202020204" pitchFamily="34" charset="0"/>
+              <a:buChar char="•"/>
+            </a:pPr>
+            <a:r>
+              <a:rPr lang="en-US"/>
+              <a:t>architecture inspired by DispNET,</a:t>
+            </a:r>
+            <a:br>
+              <a:rPr lang="en-US"/>
+            </a:br>
+            <a:r>
+              <a:rPr lang="en-US" sz="900"/>
+              <a:t>N. Mayer, E. Ilg, P. H¨ausser, P. Fischer, D. Cremers, A. Dosovitskiy, and T. Brox. A large dataset to train convolutional networks for disparity, optical flow, and scene flow estimation</a:t>
+            </a:r>
+            <a:endParaRPr lang="en-US" sz="900"/>
+          </a:p>
+          <a:p>
+            <a:pPr marL="342900" indent="-342900">
+              <a:buFont typeface="Arial" panose="020B0604020202020204" pitchFamily="34" charset="0"/>
+              <a:buChar char="•"/>
+            </a:pPr>
+            <a:r>
+              <a:rPr lang="en-US">
+                <a:sym typeface="+mn-ea"/>
+              </a:rPr>
+              <a:t>image sampler by spatial network transformer,</a:t>
+            </a:r>
+            <a:br>
+              <a:rPr lang="en-US">
+                <a:sym typeface="+mn-ea"/>
+              </a:rPr>
+            </a:br>
+            <a:r>
+              <a:rPr lang="en-US" sz="900">
+                <a:sym typeface="+mn-ea"/>
+              </a:rPr>
+              <a:t>M. Jaderberg, K. Simonyan, A. Zisserman, and K. Kavukcuoglu. Spatial transformer networks. In NIPS, 2015</a:t>
+            </a:r>
+            <a:endParaRPr lang="en-US">
+              <a:sym typeface="+mn-ea"/>
+            </a:endParaRPr>
+          </a:p>
+          <a:p>
+            <a:pPr marL="342900" indent="-342900">
+              <a:buFont typeface="Arial" panose="020B0604020202020204" pitchFamily="34" charset="0"/>
+              <a:buChar char="•"/>
+            </a:pPr>
+            <a:r>
+              <a:rPr lang="en-US">
+                <a:sym typeface="+mn-ea"/>
+              </a:rPr>
+              <a:t>Encoder Decoder structure  by </a:t>
+            </a:r>
+            <a:br>
+              <a:rPr lang="en-US">
+                <a:sym typeface="+mn-ea"/>
+              </a:rPr>
+            </a:br>
+            <a:r>
+              <a:rPr lang="en-US" sz="900">
+                <a:sym typeface="+mn-ea"/>
+              </a:rPr>
+              <a:t>V. Patraucean, A. Handa, and R. Cipolla. Spatio-temporal video autoencoder with differentiable memory. arXiv preprint arXiv:1511.06309, 2015</a:t>
+            </a:r>
+            <a:endParaRPr lang="en-US">
+              <a:sym typeface="+mn-ea"/>
+            </a:endParaRPr>
+          </a:p>
+          <a:p>
+            <a:pPr marL="342900" indent="-342900">
+              <a:buFont typeface="Arial" panose="020B0604020202020204" pitchFamily="34" charset="0"/>
+              <a:buChar char="•"/>
+            </a:pPr>
+            <a:endParaRPr lang="en-US">
+              <a:sym typeface="+mn-ea"/>
+            </a:endParaRPr>
           </a:p>
         </p:txBody>
       </p:sp>
@@ -3916,36 +3993,1056 @@
             </a:br>
             <a:r>
               <a:rPr lang="en-US"/>
-              <a:t>related literature</a:t>
+              <a:t>architecture</a:t>
             </a:r>
             <a:endParaRPr lang="en-US"/>
+          </a:p>
+        </p:txBody>
+      </p:sp>
+      <p:grpSp>
+        <p:nvGrpSpPr>
+          <p:cNvPr id="5" name="Group 4"/>
+          <p:cNvGrpSpPr/>
+          <p:nvPr/>
+        </p:nvGrpSpPr>
+        <p:grpSpPr>
+          <a:xfrm>
+            <a:off x="5170029" y="1862614"/>
+            <a:ext cx="1766656" cy="1828799"/>
+            <a:chOff x="1873188" y="2086573"/>
+            <a:chExt cx="1766656" cy="1828799"/>
+          </a:xfrm>
+          <a:solidFill>
+            <a:schemeClr val="accent2"/>
+          </a:solidFill>
+        </p:grpSpPr>
+        <p:sp>
+          <p:nvSpPr>
+            <p:cNvPr id="6" name="Rectangle 5"/>
+            <p:cNvSpPr/>
+            <p:nvPr/>
+          </p:nvSpPr>
+          <p:spPr>
+            <a:xfrm>
+              <a:off x="1873188" y="2086573"/>
+              <a:ext cx="230820" cy="1828799"/>
+            </a:xfrm>
+            <a:prstGeom prst="rect">
+              <a:avLst/>
+            </a:prstGeom>
+            <a:grpFill/>
+            <a:ln>
+              <a:noFill/>
+            </a:ln>
+          </p:spPr>
+          <p:style>
+            <a:lnRef idx="2">
+              <a:schemeClr val="accent1">
+                <a:shade val="50000"/>
+              </a:schemeClr>
+            </a:lnRef>
+            <a:fillRef idx="1">
+              <a:schemeClr val="accent1"/>
+            </a:fillRef>
+            <a:effectRef idx="0">
+              <a:schemeClr val="accent1"/>
+            </a:effectRef>
+            <a:fontRef idx="minor">
+              <a:schemeClr val="lt1"/>
+            </a:fontRef>
+          </p:style>
+          <p:txBody>
+            <a:bodyPr rtlCol="0" anchor="ctr"/>
+            <a:p>
+              <a:pPr algn="ctr"/>
+              <a:endParaRPr lang="en-US"/>
+            </a:p>
+          </p:txBody>
+        </p:sp>
+        <p:sp>
+          <p:nvSpPr>
+            <p:cNvPr id="7" name="Rectangle 6"/>
+            <p:cNvSpPr/>
+            <p:nvPr/>
+          </p:nvSpPr>
+          <p:spPr>
+            <a:xfrm>
+              <a:off x="2185387" y="2543772"/>
+              <a:ext cx="460158" cy="914399"/>
+            </a:xfrm>
+            <a:prstGeom prst="rect">
+              <a:avLst/>
+            </a:prstGeom>
+            <a:grpFill/>
+            <a:ln>
+              <a:noFill/>
+            </a:ln>
+          </p:spPr>
+          <p:style>
+            <a:lnRef idx="2">
+              <a:schemeClr val="accent1">
+                <a:shade val="50000"/>
+              </a:schemeClr>
+            </a:lnRef>
+            <a:fillRef idx="1">
+              <a:schemeClr val="accent1"/>
+            </a:fillRef>
+            <a:effectRef idx="0">
+              <a:schemeClr val="accent1"/>
+            </a:effectRef>
+            <a:fontRef idx="minor">
+              <a:schemeClr val="lt1"/>
+            </a:fontRef>
+          </p:style>
+          <p:txBody>
+            <a:bodyPr rtlCol="0" anchor="ctr"/>
+            <a:p>
+              <a:pPr algn="ctr"/>
+              <a:endParaRPr lang="en-US"/>
+            </a:p>
+          </p:txBody>
+        </p:sp>
+        <p:sp>
+          <p:nvSpPr>
+            <p:cNvPr id="8" name="Rectangle 7"/>
+            <p:cNvSpPr/>
+            <p:nvPr/>
+          </p:nvSpPr>
+          <p:spPr>
+            <a:xfrm>
+              <a:off x="2726923" y="2772372"/>
+              <a:ext cx="912921" cy="457198"/>
+            </a:xfrm>
+            <a:prstGeom prst="rect">
+              <a:avLst/>
+            </a:prstGeom>
+            <a:grpFill/>
+            <a:ln>
+              <a:noFill/>
+            </a:ln>
+          </p:spPr>
+          <p:style>
+            <a:lnRef idx="2">
+              <a:schemeClr val="accent1">
+                <a:shade val="50000"/>
+              </a:schemeClr>
+            </a:lnRef>
+            <a:fillRef idx="1">
+              <a:schemeClr val="accent1"/>
+            </a:fillRef>
+            <a:effectRef idx="0">
+              <a:schemeClr val="accent1"/>
+            </a:effectRef>
+            <a:fontRef idx="minor">
+              <a:schemeClr val="lt1"/>
+            </a:fontRef>
+          </p:style>
+          <p:txBody>
+            <a:bodyPr rtlCol="0" anchor="ctr"/>
+            <a:p>
+              <a:pPr algn="ctr"/>
+              <a:endParaRPr lang="en-US"/>
+            </a:p>
+          </p:txBody>
+        </p:sp>
+      </p:grpSp>
+      <p:grpSp>
+        <p:nvGrpSpPr>
+          <p:cNvPr id="9" name="Group 8"/>
+          <p:cNvGrpSpPr/>
+          <p:nvPr/>
+        </p:nvGrpSpPr>
+        <p:grpSpPr>
+          <a:xfrm rot="10800000">
+            <a:off x="7018063" y="1862614"/>
+            <a:ext cx="1766656" cy="1828799"/>
+            <a:chOff x="4369293" y="1972643"/>
+            <a:chExt cx="1766656" cy="1828799"/>
+          </a:xfrm>
+          <a:solidFill>
+            <a:srgbClr val="92D050"/>
+          </a:solidFill>
+        </p:grpSpPr>
+        <p:sp>
+          <p:nvSpPr>
+            <p:cNvPr id="10" name="Rectangle 9"/>
+            <p:cNvSpPr/>
+            <p:nvPr/>
+          </p:nvSpPr>
+          <p:spPr>
+            <a:xfrm>
+              <a:off x="4369293" y="1972643"/>
+              <a:ext cx="230820" cy="1828799"/>
+            </a:xfrm>
+            <a:prstGeom prst="rect">
+              <a:avLst/>
+            </a:prstGeom>
+            <a:grpFill/>
+            <a:ln>
+              <a:noFill/>
+            </a:ln>
+          </p:spPr>
+          <p:style>
+            <a:lnRef idx="2">
+              <a:schemeClr val="accent1">
+                <a:shade val="50000"/>
+              </a:schemeClr>
+            </a:lnRef>
+            <a:fillRef idx="1">
+              <a:schemeClr val="accent1"/>
+            </a:fillRef>
+            <a:effectRef idx="0">
+              <a:schemeClr val="accent1"/>
+            </a:effectRef>
+            <a:fontRef idx="minor">
+              <a:schemeClr val="lt1"/>
+            </a:fontRef>
+          </p:style>
+          <p:txBody>
+            <a:bodyPr rtlCol="0" anchor="ctr"/>
+            <a:p>
+              <a:pPr algn="ctr"/>
+              <a:endParaRPr lang="en-US"/>
+            </a:p>
+          </p:txBody>
+        </p:sp>
+        <p:sp>
+          <p:nvSpPr>
+            <p:cNvPr id="11" name="Rectangle 10"/>
+            <p:cNvSpPr/>
+            <p:nvPr/>
+          </p:nvSpPr>
+          <p:spPr>
+            <a:xfrm>
+              <a:off x="4681492" y="2429842"/>
+              <a:ext cx="460158" cy="914399"/>
+            </a:xfrm>
+            <a:prstGeom prst="rect">
+              <a:avLst/>
+            </a:prstGeom>
+            <a:grpFill/>
+            <a:ln>
+              <a:noFill/>
+            </a:ln>
+          </p:spPr>
+          <p:style>
+            <a:lnRef idx="2">
+              <a:schemeClr val="accent1">
+                <a:shade val="50000"/>
+              </a:schemeClr>
+            </a:lnRef>
+            <a:fillRef idx="1">
+              <a:schemeClr val="accent1"/>
+            </a:fillRef>
+            <a:effectRef idx="0">
+              <a:schemeClr val="accent1"/>
+            </a:effectRef>
+            <a:fontRef idx="minor">
+              <a:schemeClr val="lt1"/>
+            </a:fontRef>
+          </p:style>
+          <p:txBody>
+            <a:bodyPr rtlCol="0" anchor="ctr"/>
+            <a:p>
+              <a:pPr algn="ctr"/>
+              <a:endParaRPr lang="en-US"/>
+            </a:p>
+          </p:txBody>
+        </p:sp>
+        <p:sp>
+          <p:nvSpPr>
+            <p:cNvPr id="12" name="Rectangle 11"/>
+            <p:cNvSpPr/>
+            <p:nvPr/>
+          </p:nvSpPr>
+          <p:spPr>
+            <a:xfrm>
+              <a:off x="5223028" y="2658442"/>
+              <a:ext cx="912921" cy="457198"/>
+            </a:xfrm>
+            <a:prstGeom prst="rect">
+              <a:avLst/>
+            </a:prstGeom>
+            <a:grpFill/>
+            <a:ln>
+              <a:noFill/>
+            </a:ln>
+          </p:spPr>
+          <p:style>
+            <a:lnRef idx="2">
+              <a:schemeClr val="accent1">
+                <a:shade val="50000"/>
+              </a:schemeClr>
+            </a:lnRef>
+            <a:fillRef idx="1">
+              <a:schemeClr val="accent1"/>
+            </a:fillRef>
+            <a:effectRef idx="0">
+              <a:schemeClr val="accent1"/>
+            </a:effectRef>
+            <a:fontRef idx="minor">
+              <a:schemeClr val="lt1"/>
+            </a:fontRef>
+          </p:style>
+          <p:txBody>
+            <a:bodyPr rtlCol="0" anchor="ctr"/>
+            <a:p>
+              <a:pPr algn="ctr"/>
+              <a:endParaRPr lang="en-US"/>
+            </a:p>
+          </p:txBody>
+        </p:sp>
+      </p:grpSp>
+      <p:sp>
+        <p:nvSpPr>
+          <p:cNvPr id="13" name="TextBox 12"/>
+          <p:cNvSpPr txBox="1"/>
+          <p:nvPr/>
+        </p:nvSpPr>
+        <p:spPr>
+          <a:xfrm>
+            <a:off x="5740420" y="4039376"/>
+            <a:ext cx="851515" cy="307777"/>
+          </a:xfrm>
+          <a:prstGeom prst="rect">
+            <a:avLst/>
+          </a:prstGeom>
+          <a:noFill/>
+        </p:spPr>
+        <p:txBody>
+          <a:bodyPr wrap="none" rtlCol="0">
+            <a:spAutoFit/>
+          </a:bodyPr>
+          <a:p>
+            <a:r>
+              <a:rPr lang="en-US" dirty="0" smtClean="0">
+                <a:solidFill>
+                  <a:schemeClr val="accent2"/>
+                </a:solidFill>
+              </a:rPr>
+              <a:t>Encoder</a:t>
+            </a:r>
+            <a:endParaRPr lang="en-US" dirty="0">
+              <a:solidFill>
+                <a:schemeClr val="accent2"/>
+              </a:solidFill>
+            </a:endParaRPr>
           </a:p>
         </p:txBody>
       </p:sp>
       <p:sp>
         <p:nvSpPr>
-          <p:cNvPr id="3" name="Content Placeholder 2"/>
-          <p:cNvSpPr>
-            <a:spLocks noGrp="1"/>
-          </p:cNvSpPr>
-          <p:nvPr>
-            <p:ph idx="1"/>
-          </p:nvPr>
+          <p:cNvPr id="14" name="TextBox 13"/>
+          <p:cNvSpPr txBox="1"/>
+          <p:nvPr/>
         </p:nvSpPr>
-        <p:spPr/>
+        <p:spPr>
+          <a:xfrm>
+            <a:off x="7227984" y="4043163"/>
+            <a:ext cx="861133" cy="307777"/>
+          </a:xfrm>
+          <a:prstGeom prst="rect">
+            <a:avLst/>
+          </a:prstGeom>
+          <a:noFill/>
+        </p:spPr>
         <p:txBody>
-          <a:bodyPr/>
-          <a:lstStyle/>
+          <a:bodyPr wrap="none" rtlCol="0">
+            <a:spAutoFit/>
+          </a:bodyPr>
           <a:p>
-            <a:endParaRPr lang="en-US"/>
+            <a:r>
+              <a:rPr lang="en-US" dirty="0" smtClean="0">
+                <a:gradFill>
+                  <a:gsLst>
+                    <a:gs pos="0">
+                      <a:srgbClr val="9EE256"/>
+                    </a:gs>
+                    <a:gs pos="100000">
+                      <a:srgbClr val="52762D"/>
+                    </a:gs>
+                  </a:gsLst>
+                  <a:lin ang="5400000" scaled="0"/>
+                </a:gradFill>
+              </a:rPr>
+              <a:t>Decoder</a:t>
+            </a:r>
+            <a:endParaRPr lang="en-US" dirty="0" smtClean="0">
+              <a:gradFill>
+                <a:gsLst>
+                  <a:gs pos="0">
+                    <a:srgbClr val="9EE256"/>
+                  </a:gs>
+                  <a:gs pos="100000">
+                    <a:srgbClr val="52762D"/>
+                  </a:gs>
+                </a:gsLst>
+                <a:lin ang="5400000" scaled="0"/>
+              </a:gradFill>
+            </a:endParaRPr>
           </a:p>
         </p:txBody>
       </p:sp>
+      <p:grpSp>
+        <p:nvGrpSpPr>
+          <p:cNvPr id="30" name="Group 29"/>
+          <p:cNvGrpSpPr/>
+          <p:nvPr/>
+        </p:nvGrpSpPr>
+        <p:grpSpPr>
+          <a:xfrm>
+            <a:off x="5437775" y="1650324"/>
+            <a:ext cx="3067478" cy="769525"/>
+            <a:chOff x="5303790" y="242529"/>
+            <a:chExt cx="3067478" cy="769525"/>
+          </a:xfrm>
+        </p:grpSpPr>
+        <p:cxnSp>
+          <p:nvCxnSpPr>
+            <p:cNvPr id="16" name="Straight Arrow Connector 15"/>
+            <p:cNvCxnSpPr/>
+            <p:nvPr/>
+          </p:nvCxnSpPr>
+          <p:spPr>
+            <a:xfrm>
+              <a:off x="5889779" y="1012054"/>
+              <a:ext cx="1945856" cy="0"/>
+            </a:xfrm>
+            <a:prstGeom prst="straightConnector1">
+              <a:avLst/>
+            </a:prstGeom>
+            <a:ln w="38100">
+              <a:tailEnd type="triangle"/>
+            </a:ln>
+          </p:spPr>
+          <p:style>
+            <a:lnRef idx="1">
+              <a:schemeClr val="accent1"/>
+            </a:lnRef>
+            <a:fillRef idx="0">
+              <a:schemeClr val="accent1"/>
+            </a:fillRef>
+            <a:effectRef idx="0">
+              <a:schemeClr val="accent1"/>
+            </a:effectRef>
+            <a:fontRef idx="minor">
+              <a:schemeClr val="tx1"/>
+            </a:fontRef>
+          </p:style>
+        </p:cxnSp>
+        <p:cxnSp>
+          <p:nvCxnSpPr>
+            <p:cNvPr id="18" name="Straight Arrow Connector 17"/>
+            <p:cNvCxnSpPr/>
+            <p:nvPr/>
+          </p:nvCxnSpPr>
+          <p:spPr>
+            <a:xfrm>
+              <a:off x="5303790" y="653592"/>
+              <a:ext cx="3067478" cy="0"/>
+            </a:xfrm>
+            <a:prstGeom prst="straightConnector1">
+              <a:avLst/>
+            </a:prstGeom>
+            <a:ln w="38100">
+              <a:tailEnd type="triangle"/>
+            </a:ln>
+          </p:spPr>
+          <p:style>
+            <a:lnRef idx="1">
+              <a:schemeClr val="accent1"/>
+            </a:lnRef>
+            <a:fillRef idx="0">
+              <a:schemeClr val="accent1"/>
+            </a:fillRef>
+            <a:effectRef idx="0">
+              <a:schemeClr val="accent1"/>
+            </a:effectRef>
+            <a:fontRef idx="minor">
+              <a:schemeClr val="tx1"/>
+            </a:fontRef>
+          </p:style>
+        </p:cxnSp>
+        <p:sp>
+          <p:nvSpPr>
+            <p:cNvPr id="20" name="TextBox 19"/>
+            <p:cNvSpPr txBox="1"/>
+            <p:nvPr/>
+          </p:nvSpPr>
+          <p:spPr>
+            <a:xfrm>
+              <a:off x="6525584" y="242529"/>
+              <a:ext cx="623889" cy="307777"/>
+            </a:xfrm>
+            <a:prstGeom prst="rect">
+              <a:avLst/>
+            </a:prstGeom>
+            <a:noFill/>
+          </p:spPr>
+          <p:txBody>
+            <a:bodyPr wrap="none" rtlCol="0">
+              <a:spAutoFit/>
+            </a:bodyPr>
+            <a:p>
+              <a:r>
+                <a:rPr lang="en-US" dirty="0" smtClean="0">
+                  <a:solidFill>
+                    <a:schemeClr val="accent1"/>
+                  </a:solidFill>
+                </a:rPr>
+                <a:t>Skips</a:t>
+              </a:r>
+              <a:endParaRPr lang="en-US" dirty="0">
+                <a:solidFill>
+                  <a:schemeClr val="accent1"/>
+                </a:solidFill>
+              </a:endParaRPr>
+            </a:p>
+          </p:txBody>
+        </p:sp>
+      </p:grpSp>
+      <p:grpSp>
+        <p:nvGrpSpPr>
+          <p:cNvPr id="31" name="Group 30"/>
+          <p:cNvGrpSpPr/>
+          <p:nvPr/>
+        </p:nvGrpSpPr>
+        <p:grpSpPr>
+          <a:xfrm>
+            <a:off x="7742458" y="3005611"/>
+            <a:ext cx="1054592" cy="2740987"/>
+            <a:chOff x="7608473" y="1597816"/>
+            <a:chExt cx="1054592" cy="2740987"/>
+          </a:xfrm>
+        </p:grpSpPr>
+        <p:cxnSp>
+          <p:nvCxnSpPr>
+            <p:cNvPr id="22" name="Straight Arrow Connector 21"/>
+            <p:cNvCxnSpPr/>
+            <p:nvPr/>
+          </p:nvCxnSpPr>
+          <p:spPr>
+            <a:xfrm>
+              <a:off x="7765774" y="1597816"/>
+              <a:ext cx="0" cy="228601"/>
+            </a:xfrm>
+            <a:prstGeom prst="straightConnector1">
+              <a:avLst/>
+            </a:prstGeom>
+            <a:ln w="38100">
+              <a:tailEnd type="triangle"/>
+            </a:ln>
+          </p:spPr>
+          <p:style>
+            <a:lnRef idx="1">
+              <a:schemeClr val="accent1"/>
+            </a:lnRef>
+            <a:fillRef idx="0">
+              <a:schemeClr val="accent1"/>
+            </a:fillRef>
+            <a:effectRef idx="0">
+              <a:schemeClr val="accent1"/>
+            </a:effectRef>
+            <a:fontRef idx="minor">
+              <a:schemeClr val="tx1"/>
+            </a:fontRef>
+          </p:style>
+        </p:cxnSp>
+        <p:sp>
+          <p:nvSpPr>
+            <p:cNvPr id="23" name="Rectangle 22"/>
+            <p:cNvSpPr/>
+            <p:nvPr/>
+          </p:nvSpPr>
+          <p:spPr>
+            <a:xfrm rot="10800000">
+              <a:off x="7721103" y="1843710"/>
+              <a:ext cx="89341" cy="457198"/>
+            </a:xfrm>
+            <a:prstGeom prst="rect">
+              <a:avLst/>
+            </a:prstGeom>
+            <a:solidFill>
+              <a:srgbClr val="C00000"/>
+            </a:solidFill>
+            <a:ln>
+              <a:noFill/>
+            </a:ln>
+          </p:spPr>
+          <p:style>
+            <a:lnRef idx="2">
+              <a:schemeClr val="accent1">
+                <a:shade val="50000"/>
+              </a:schemeClr>
+            </a:lnRef>
+            <a:fillRef idx="1">
+              <a:schemeClr val="accent1"/>
+            </a:fillRef>
+            <a:effectRef idx="0">
+              <a:schemeClr val="accent1"/>
+            </a:effectRef>
+            <a:fontRef idx="minor">
+              <a:schemeClr val="lt1"/>
+            </a:fontRef>
+          </p:style>
+          <p:txBody>
+            <a:bodyPr rtlCol="0" anchor="ctr"/>
+            <a:p>
+              <a:pPr algn="ctr"/>
+              <a:endParaRPr lang="en-US"/>
+            </a:p>
+          </p:txBody>
+        </p:sp>
+        <p:cxnSp>
+          <p:nvCxnSpPr>
+            <p:cNvPr id="24" name="Straight Arrow Connector 23"/>
+            <p:cNvCxnSpPr/>
+            <p:nvPr/>
+          </p:nvCxnSpPr>
+          <p:spPr>
+            <a:xfrm>
+              <a:off x="8308540" y="1826417"/>
+              <a:ext cx="0" cy="228601"/>
+            </a:xfrm>
+            <a:prstGeom prst="straightConnector1">
+              <a:avLst/>
+            </a:prstGeom>
+            <a:ln w="38100">
+              <a:tailEnd type="triangle"/>
+            </a:ln>
+          </p:spPr>
+          <p:style>
+            <a:lnRef idx="1">
+              <a:schemeClr val="accent1"/>
+            </a:lnRef>
+            <a:fillRef idx="0">
+              <a:schemeClr val="accent1"/>
+            </a:fillRef>
+            <a:effectRef idx="0">
+              <a:schemeClr val="accent1"/>
+            </a:effectRef>
+            <a:fontRef idx="minor">
+              <a:schemeClr val="tx1"/>
+            </a:fontRef>
+          </p:style>
+        </p:cxnSp>
+        <p:sp>
+          <p:nvSpPr>
+            <p:cNvPr id="25" name="Rectangle 24"/>
+            <p:cNvSpPr/>
+            <p:nvPr/>
+          </p:nvSpPr>
+          <p:spPr>
+            <a:xfrm rot="10800000">
+              <a:off x="8262010" y="2072309"/>
+              <a:ext cx="86710" cy="912189"/>
+            </a:xfrm>
+            <a:prstGeom prst="rect">
+              <a:avLst/>
+            </a:prstGeom>
+            <a:solidFill>
+              <a:srgbClr val="C00000"/>
+            </a:solidFill>
+            <a:ln>
+              <a:noFill/>
+            </a:ln>
+          </p:spPr>
+          <p:style>
+            <a:lnRef idx="2">
+              <a:schemeClr val="accent1">
+                <a:shade val="50000"/>
+              </a:schemeClr>
+            </a:lnRef>
+            <a:fillRef idx="1">
+              <a:schemeClr val="accent1"/>
+            </a:fillRef>
+            <a:effectRef idx="0">
+              <a:schemeClr val="accent1"/>
+            </a:effectRef>
+            <a:fontRef idx="minor">
+              <a:schemeClr val="lt1"/>
+            </a:fontRef>
+          </p:style>
+          <p:txBody>
+            <a:bodyPr rtlCol="0" anchor="ctr"/>
+            <a:p>
+              <a:pPr algn="ctr"/>
+              <a:endParaRPr lang="en-US"/>
+            </a:p>
+          </p:txBody>
+        </p:sp>
+        <p:cxnSp>
+          <p:nvCxnSpPr>
+            <p:cNvPr id="26" name="Straight Arrow Connector 25"/>
+            <p:cNvCxnSpPr/>
+            <p:nvPr/>
+          </p:nvCxnSpPr>
+          <p:spPr>
+            <a:xfrm>
+              <a:off x="8616138" y="2282511"/>
+              <a:ext cx="0" cy="228601"/>
+            </a:xfrm>
+            <a:prstGeom prst="straightConnector1">
+              <a:avLst/>
+            </a:prstGeom>
+            <a:ln w="38100">
+              <a:tailEnd type="triangle"/>
+            </a:ln>
+          </p:spPr>
+          <p:style>
+            <a:lnRef idx="1">
+              <a:schemeClr val="accent1"/>
+            </a:lnRef>
+            <a:fillRef idx="0">
+              <a:schemeClr val="accent1"/>
+            </a:fillRef>
+            <a:effectRef idx="0">
+              <a:schemeClr val="accent1"/>
+            </a:effectRef>
+            <a:fontRef idx="minor">
+              <a:schemeClr val="tx1"/>
+            </a:fontRef>
+          </p:style>
+        </p:cxnSp>
+        <p:sp>
+          <p:nvSpPr>
+            <p:cNvPr id="27" name="Rectangle 26"/>
+            <p:cNvSpPr/>
+            <p:nvPr/>
+          </p:nvSpPr>
+          <p:spPr>
+            <a:xfrm rot="10800000">
+              <a:off x="8567207" y="2528403"/>
+              <a:ext cx="95858" cy="1810400"/>
+            </a:xfrm>
+            <a:prstGeom prst="rect">
+              <a:avLst/>
+            </a:prstGeom>
+            <a:solidFill>
+              <a:srgbClr val="C00000"/>
+            </a:solidFill>
+            <a:ln>
+              <a:noFill/>
+            </a:ln>
+          </p:spPr>
+          <p:style>
+            <a:lnRef idx="2">
+              <a:schemeClr val="accent1">
+                <a:shade val="50000"/>
+              </a:schemeClr>
+            </a:lnRef>
+            <a:fillRef idx="1">
+              <a:schemeClr val="accent1"/>
+            </a:fillRef>
+            <a:effectRef idx="0">
+              <a:schemeClr val="accent1"/>
+            </a:effectRef>
+            <a:fontRef idx="minor">
+              <a:schemeClr val="lt1"/>
+            </a:fontRef>
+          </p:style>
+          <p:txBody>
+            <a:bodyPr rtlCol="0" anchor="ctr"/>
+            <a:p>
+              <a:pPr algn="ctr"/>
+              <a:endParaRPr lang="en-US"/>
+            </a:p>
+          </p:txBody>
+        </p:sp>
+        <p:sp>
+          <p:nvSpPr>
+            <p:cNvPr id="29" name="TextBox 28"/>
+            <p:cNvSpPr txBox="1"/>
+            <p:nvPr/>
+          </p:nvSpPr>
+          <p:spPr>
+            <a:xfrm>
+              <a:off x="7608473" y="3259913"/>
+              <a:ext cx="811441" cy="307777"/>
+            </a:xfrm>
+            <a:prstGeom prst="rect">
+              <a:avLst/>
+            </a:prstGeom>
+            <a:noFill/>
+          </p:spPr>
+          <p:txBody>
+            <a:bodyPr wrap="none" rtlCol="0">
+              <a:spAutoFit/>
+            </a:bodyPr>
+            <a:p>
+              <a:pPr algn="ctr"/>
+              <a:r>
+                <a:rPr lang="en-US" smtClean="0">
+                  <a:solidFill>
+                    <a:srgbClr val="C00000"/>
+                  </a:solidFill>
+                </a:rPr>
+                <a:t>Outputs</a:t>
+              </a:r>
+              <a:endParaRPr lang="en-US" dirty="0">
+                <a:solidFill>
+                  <a:srgbClr val="C00000"/>
+                </a:solidFill>
+              </a:endParaRPr>
+            </a:p>
+          </p:txBody>
+        </p:sp>
+      </p:grpSp>
     </p:spTree>
   </p:cSld>
   <p:clrMapOvr>
     <a:masterClrMapping/>
   </p:clrMapOvr>
+  <p:timing>
+    <p:tnLst>
+      <p:par>
+        <p:cTn id="1" dur="indefinite" restart="never" nodeType="tmRoot">
+          <p:childTnLst>
+            <p:seq concurrent="1" nextAc="seek">
+              <p:cTn id="2" dur="indefinite" nodeType="mainSeq">
+                <p:childTnLst>
+                  <p:par>
+                    <p:cTn id="3" fill="hold">
+                      <p:stCondLst>
+                        <p:cond delay="indefinite"/>
+                      </p:stCondLst>
+                      <p:childTnLst>
+                        <p:par>
+                          <p:cTn id="4" fill="hold">
+                            <p:stCondLst>
+                              <p:cond delay="0"/>
+                            </p:stCondLst>
+                            <p:childTnLst>
+                              <p:par>
+                                <p:cTn id="5" presetID="1" presetClass="entr" presetSubtype="0" fill="hold" nodeType="clickEffect">
+                                  <p:stCondLst>
+                                    <p:cond delay="0"/>
+                                  </p:stCondLst>
+                                  <p:childTnLst>
+                                    <p:set>
+                                      <p:cBhvr>
+                                        <p:cTn id="6" dur="1" fill="hold">
+                                          <p:stCondLst>
+                                            <p:cond delay="0"/>
+                                          </p:stCondLst>
+                                        </p:cTn>
+                                        <p:tgtEl>
+                                          <p:spTgt spid="5"/>
+                                        </p:tgtEl>
+                                        <p:attrNameLst>
+                                          <p:attrName>style.visibility</p:attrName>
+                                        </p:attrNameLst>
+                                      </p:cBhvr>
+                                      <p:to>
+                                        <p:strVal val="visible"/>
+                                      </p:to>
+                                    </p:set>
+                                  </p:childTnLst>
+                                </p:cTn>
+                              </p:par>
+                              <p:par>
+                                <p:cTn id="7" presetID="1" presetClass="entr" presetSubtype="0" fill="hold" nodeType="withEffect">
+                                  <p:stCondLst>
+                                    <p:cond delay="0"/>
+                                  </p:stCondLst>
+                                  <p:childTnLst>
+                                    <p:set>
+                                      <p:cBhvr>
+                                        <p:cTn id="8" dur="1" fill="hold">
+                                          <p:stCondLst>
+                                            <p:cond delay="0"/>
+                                          </p:stCondLst>
+                                        </p:cTn>
+                                        <p:tgtEl>
+                                          <p:spTgt spid="9"/>
+                                        </p:tgtEl>
+                                        <p:attrNameLst>
+                                          <p:attrName>style.visibility</p:attrName>
+                                        </p:attrNameLst>
+                                      </p:cBhvr>
+                                      <p:to>
+                                        <p:strVal val="visible"/>
+                                      </p:to>
+                                    </p:set>
+                                  </p:childTnLst>
+                                </p:cTn>
+                              </p:par>
+                              <p:par>
+                                <p:cTn id="9" presetID="1" presetClass="entr" presetSubtype="0" fill="hold" grpId="0" nodeType="withEffect">
+                                  <p:stCondLst>
+                                    <p:cond delay="0"/>
+                                  </p:stCondLst>
+                                  <p:childTnLst>
+                                    <p:set>
+                                      <p:cBhvr>
+                                        <p:cTn id="10" dur="1" fill="hold">
+                                          <p:stCondLst>
+                                            <p:cond delay="0"/>
+                                          </p:stCondLst>
+                                        </p:cTn>
+                                        <p:tgtEl>
+                                          <p:spTgt spid="13"/>
+                                        </p:tgtEl>
+                                        <p:attrNameLst>
+                                          <p:attrName>style.visibility</p:attrName>
+                                        </p:attrNameLst>
+                                      </p:cBhvr>
+                                      <p:to>
+                                        <p:strVal val="visible"/>
+                                      </p:to>
+                                    </p:set>
+                                  </p:childTnLst>
+                                </p:cTn>
+                              </p:par>
+                              <p:par>
+                                <p:cTn id="11" presetID="1" presetClass="entr" presetSubtype="0" fill="hold" grpId="0" nodeType="withEffect">
+                                  <p:stCondLst>
+                                    <p:cond delay="0"/>
+                                  </p:stCondLst>
+                                  <p:childTnLst>
+                                    <p:set>
+                                      <p:cBhvr>
+                                        <p:cTn id="12" dur="1" fill="hold">
+                                          <p:stCondLst>
+                                            <p:cond delay="0"/>
+                                          </p:stCondLst>
+                                        </p:cTn>
+                                        <p:tgtEl>
+                                          <p:spTgt spid="14"/>
+                                        </p:tgtEl>
+                                        <p:attrNameLst>
+                                          <p:attrName>style.visibility</p:attrName>
+                                        </p:attrNameLst>
+                                      </p:cBhvr>
+                                      <p:to>
+                                        <p:strVal val="visible"/>
+                                      </p:to>
+                                    </p:set>
+                                  </p:childTnLst>
+                                </p:cTn>
+                              </p:par>
+                            </p:childTnLst>
+                          </p:cTn>
+                        </p:par>
+                      </p:childTnLst>
+                    </p:cTn>
+                  </p:par>
+                  <p:par>
+                    <p:cTn id="13" fill="hold">
+                      <p:stCondLst>
+                        <p:cond delay="indefinite"/>
+                      </p:stCondLst>
+                      <p:childTnLst>
+                        <p:par>
+                          <p:cTn id="14" fill="hold">
+                            <p:stCondLst>
+                              <p:cond delay="0"/>
+                            </p:stCondLst>
+                            <p:childTnLst>
+                              <p:par>
+                                <p:cTn id="15" presetID="1" presetClass="entr" presetSubtype="0" fill="hold" nodeType="clickEffect">
+                                  <p:stCondLst>
+                                    <p:cond delay="0"/>
+                                  </p:stCondLst>
+                                  <p:childTnLst>
+                                    <p:set>
+                                      <p:cBhvr>
+                                        <p:cTn id="16" dur="1" fill="hold">
+                                          <p:stCondLst>
+                                            <p:cond delay="0"/>
+                                          </p:stCondLst>
+                                        </p:cTn>
+                                        <p:tgtEl>
+                                          <p:spTgt spid="30"/>
+                                        </p:tgtEl>
+                                        <p:attrNameLst>
+                                          <p:attrName>style.visibility</p:attrName>
+                                        </p:attrNameLst>
+                                      </p:cBhvr>
+                                      <p:to>
+                                        <p:strVal val="visible"/>
+                                      </p:to>
+                                    </p:set>
+                                  </p:childTnLst>
+                                </p:cTn>
+                              </p:par>
+                            </p:childTnLst>
+                          </p:cTn>
+                        </p:par>
+                      </p:childTnLst>
+                    </p:cTn>
+                  </p:par>
+                  <p:par>
+                    <p:cTn id="17" fill="hold">
+                      <p:stCondLst>
+                        <p:cond delay="indefinite"/>
+                      </p:stCondLst>
+                      <p:childTnLst>
+                        <p:par>
+                          <p:cTn id="18" fill="hold">
+                            <p:stCondLst>
+                              <p:cond delay="0"/>
+                            </p:stCondLst>
+                            <p:childTnLst>
+                              <p:par>
+                                <p:cTn id="19" presetID="1" presetClass="entr" presetSubtype="0" fill="hold" nodeType="clickEffect">
+                                  <p:stCondLst>
+                                    <p:cond delay="0"/>
+                                  </p:stCondLst>
+                                  <p:childTnLst>
+                                    <p:set>
+                                      <p:cBhvr>
+                                        <p:cTn id="20" dur="1" fill="hold">
+                                          <p:stCondLst>
+                                            <p:cond delay="0"/>
+                                          </p:stCondLst>
+                                        </p:cTn>
+                                        <p:tgtEl>
+                                          <p:spTgt spid="31"/>
+                                        </p:tgtEl>
+                                        <p:attrNameLst>
+                                          <p:attrName>style.visibility</p:attrName>
+                                        </p:attrNameLst>
+                                      </p:cBhvr>
+                                      <p:to>
+                                        <p:strVal val="visible"/>
+                                      </p:to>
+                                    </p:set>
+                                  </p:childTnLst>
+                                </p:cTn>
+                              </p:par>
+                            </p:childTnLst>
+                          </p:cTn>
+                        </p:par>
+                      </p:childTnLst>
+                    </p:cTn>
+                  </p:par>
+                </p:childTnLst>
+              </p:cTn>
+              <p:prevCondLst>
+                <p:cond evt="onPrev" delay="0">
+                  <p:tgtEl>
+                    <p:sldTgt/>
+                  </p:tgtEl>
+                </p:cond>
+              </p:prevCondLst>
+              <p:nextCondLst>
+                <p:cond evt="onNext" delay="0">
+                  <p:tgtEl>
+                    <p:sldTgt/>
+                  </p:tgtEl>
+                </p:cond>
+              </p:nextCondLst>
+            </p:seq>
+          </p:childTnLst>
+        </p:cTn>
+      </p:par>
+    </p:tnLst>
+    <p:bldLst>
+      <p:bldP spid="13" grpId="0"/>
+      <p:bldP spid="14" grpId="0"/>
+    </p:bldLst>
+  </p:timing>
 </p:sld>
 </file>
 
@@ -3983,6 +5080,551 @@
           <a:p>
             <a:r>
               <a:rPr lang="en-US"/>
+              <a:t>m1_1</a:t>
+            </a:r>
+            <a:br>
+              <a:rPr lang="en-US"/>
+            </a:br>
+            <a:r>
+              <a:rPr lang="en-US"/>
+              <a:t>loss function</a:t>
+            </a:r>
+            <a:endParaRPr lang="en-US"/>
+          </a:p>
+        </p:txBody>
+      </p:sp>
+      <p:pic>
+        <p:nvPicPr>
+          <p:cNvPr id="4" name="Content Placeholder 3"/>
+          <p:cNvPicPr>
+            <a:picLocks noChangeAspect="1"/>
+          </p:cNvPicPr>
+          <p:nvPr>
+            <p:ph idx="1"/>
+          </p:nvPr>
+        </p:nvPicPr>
+        <p:blipFill>
+          <a:blip r:embed="rId1"/>
+          <a:stretch>
+            <a:fillRect/>
+          </a:stretch>
+        </p:blipFill>
+        <p:spPr>
+          <a:xfrm>
+            <a:off x="1003300" y="1659255"/>
+            <a:ext cx="6823710" cy="650240"/>
+          </a:xfrm>
+          <a:prstGeom prst="rect">
+            <a:avLst/>
+          </a:prstGeom>
+        </p:spPr>
+      </p:pic>
+      <p:cxnSp>
+        <p:nvCxnSpPr>
+          <p:cNvPr id="6" name="Straight Arrow Connector 5"/>
+          <p:cNvCxnSpPr/>
+          <p:nvPr/>
+        </p:nvCxnSpPr>
+        <p:spPr>
+          <a:xfrm flipV="1">
+            <a:off x="2921635" y="2437765"/>
+            <a:ext cx="0" cy="799465"/>
+          </a:xfrm>
+          <a:prstGeom prst="straightConnector1">
+            <a:avLst/>
+          </a:prstGeom>
+          <a:ln w="38100">
+            <a:solidFill>
+              <a:schemeClr val="accent6"/>
+            </a:solidFill>
+            <a:tailEnd type="triangle"/>
+          </a:ln>
+        </p:spPr>
+        <p:style>
+          <a:lnRef idx="1">
+            <a:schemeClr val="accent1"/>
+          </a:lnRef>
+          <a:fillRef idx="0">
+            <a:schemeClr val="accent1"/>
+          </a:fillRef>
+          <a:effectRef idx="0">
+            <a:schemeClr val="accent1"/>
+          </a:effectRef>
+          <a:fontRef idx="minor">
+            <a:schemeClr val="tx1"/>
+          </a:fontRef>
+        </p:style>
+      </p:cxnSp>
+      <p:cxnSp>
+        <p:nvCxnSpPr>
+          <p:cNvPr id="5" name="Straight Arrow Connector 4"/>
+          <p:cNvCxnSpPr/>
+          <p:nvPr/>
+        </p:nvCxnSpPr>
+        <p:spPr>
+          <a:xfrm flipV="1">
+            <a:off x="5110480" y="2376805"/>
+            <a:ext cx="0" cy="799465"/>
+          </a:xfrm>
+          <a:prstGeom prst="straightConnector1">
+            <a:avLst/>
+          </a:prstGeom>
+          <a:ln w="38100">
+            <a:solidFill>
+              <a:schemeClr val="accent6"/>
+            </a:solidFill>
+            <a:tailEnd type="triangle"/>
+          </a:ln>
+        </p:spPr>
+        <p:style>
+          <a:lnRef idx="1">
+            <a:schemeClr val="accent1"/>
+          </a:lnRef>
+          <a:fillRef idx="0">
+            <a:schemeClr val="accent1"/>
+          </a:fillRef>
+          <a:effectRef idx="0">
+            <a:schemeClr val="accent1"/>
+          </a:effectRef>
+          <a:fontRef idx="minor">
+            <a:schemeClr val="tx1"/>
+          </a:fontRef>
+        </p:style>
+      </p:cxnSp>
+      <p:cxnSp>
+        <p:nvCxnSpPr>
+          <p:cNvPr id="7" name="Straight Arrow Connector 6"/>
+          <p:cNvCxnSpPr/>
+          <p:nvPr/>
+        </p:nvCxnSpPr>
+        <p:spPr>
+          <a:xfrm flipV="1">
+            <a:off x="7146925" y="2376805"/>
+            <a:ext cx="0" cy="799465"/>
+          </a:xfrm>
+          <a:prstGeom prst="straightConnector1">
+            <a:avLst/>
+          </a:prstGeom>
+          <a:ln w="38100">
+            <a:solidFill>
+              <a:schemeClr val="accent6"/>
+            </a:solidFill>
+            <a:tailEnd type="triangle"/>
+          </a:ln>
+        </p:spPr>
+        <p:style>
+          <a:lnRef idx="1">
+            <a:schemeClr val="accent1"/>
+          </a:lnRef>
+          <a:fillRef idx="0">
+            <a:schemeClr val="accent1"/>
+          </a:fillRef>
+          <a:effectRef idx="0">
+            <a:schemeClr val="accent1"/>
+          </a:effectRef>
+          <a:fontRef idx="minor">
+            <a:schemeClr val="tx1"/>
+          </a:fontRef>
+        </p:style>
+      </p:cxnSp>
+      <p:sp>
+        <p:nvSpPr>
+          <p:cNvPr id="718" name="Shape 718"/>
+          <p:cNvSpPr txBox="1"/>
+          <p:nvPr/>
+        </p:nvSpPr>
+        <p:spPr>
+          <a:xfrm>
+            <a:off x="1448435" y="3411220"/>
+            <a:ext cx="2480945" cy="467995"/>
+          </a:xfrm>
+          <a:prstGeom prst="rect">
+            <a:avLst/>
+          </a:prstGeom>
+          <a:noFill/>
+          <a:ln>
+            <a:noFill/>
+          </a:ln>
+        </p:spPr>
+        <p:txBody>
+          <a:bodyPr lIns="91425" tIns="91425" rIns="91425" bIns="91425" anchor="t" anchorCtr="0">
+            <a:noAutofit/>
+          </a:bodyPr>
+          <a:p>
+            <a:pPr lvl="0" algn="ctr" rtl="0">
+              <a:spcBef>
+                <a:spcPts val="0"/>
+              </a:spcBef>
+              <a:buNone/>
+            </a:pPr>
+            <a:r>
+              <a:rPr lang="en-US" altLang="en-GB" sz="2400" b="1">
+                <a:solidFill>
+                  <a:srgbClr val="6AA84F"/>
+                </a:solidFill>
+              </a:rPr>
+              <a:t>1. Appearance Matching Loss</a:t>
+            </a:r>
+            <a:endParaRPr lang="en-US" altLang="en-GB" sz="2400" b="1">
+              <a:solidFill>
+                <a:srgbClr val="6AA84F"/>
+              </a:solidFill>
+            </a:endParaRPr>
+          </a:p>
+        </p:txBody>
+      </p:sp>
+      <p:sp>
+        <p:nvSpPr>
+          <p:cNvPr id="10" name="Shape 718"/>
+          <p:cNvSpPr txBox="1"/>
+          <p:nvPr/>
+        </p:nvSpPr>
+        <p:spPr>
+          <a:xfrm>
+            <a:off x="3929380" y="3411220"/>
+            <a:ext cx="2480945" cy="467995"/>
+          </a:xfrm>
+          <a:prstGeom prst="rect">
+            <a:avLst/>
+          </a:prstGeom>
+          <a:noFill/>
+          <a:ln>
+            <a:noFill/>
+          </a:ln>
+        </p:spPr>
+        <p:txBody>
+          <a:bodyPr lIns="91425" tIns="91425" rIns="91425" bIns="91425" anchor="t" anchorCtr="0">
+            <a:noAutofit/>
+          </a:bodyPr>
+          <a:p>
+            <a:pPr lvl="0" algn="ctr" rtl="0">
+              <a:spcBef>
+                <a:spcPts val="0"/>
+              </a:spcBef>
+              <a:buNone/>
+            </a:pPr>
+            <a:r>
+              <a:rPr lang="en-US" altLang="en-GB" sz="2400" b="1">
+                <a:solidFill>
+                  <a:srgbClr val="6AA84F"/>
+                </a:solidFill>
+              </a:rPr>
+              <a:t>2. Disparity Smoothness Loss</a:t>
+            </a:r>
+            <a:endParaRPr lang="en-US" altLang="en-GB" sz="2400" b="1">
+              <a:solidFill>
+                <a:srgbClr val="6AA84F"/>
+              </a:solidFill>
+            </a:endParaRPr>
+          </a:p>
+        </p:txBody>
+      </p:sp>
+      <p:sp>
+        <p:nvSpPr>
+          <p:cNvPr id="11" name="Shape 718"/>
+          <p:cNvSpPr txBox="1"/>
+          <p:nvPr/>
+        </p:nvSpPr>
+        <p:spPr>
+          <a:xfrm>
+            <a:off x="6351270" y="3411220"/>
+            <a:ext cx="2480945" cy="467995"/>
+          </a:xfrm>
+          <a:prstGeom prst="rect">
+            <a:avLst/>
+          </a:prstGeom>
+          <a:noFill/>
+          <a:ln>
+            <a:noFill/>
+          </a:ln>
+        </p:spPr>
+        <p:txBody>
+          <a:bodyPr lIns="91425" tIns="91425" rIns="91425" bIns="91425" anchor="t" anchorCtr="0">
+            <a:noAutofit/>
+          </a:bodyPr>
+          <a:p>
+            <a:pPr lvl="0" algn="ctr" rtl="0">
+              <a:spcBef>
+                <a:spcPts val="0"/>
+              </a:spcBef>
+              <a:buNone/>
+            </a:pPr>
+            <a:r>
+              <a:rPr lang="en-US" altLang="en-GB" sz="2400" b="1">
+                <a:solidFill>
+                  <a:srgbClr val="6AA84F"/>
+                </a:solidFill>
+              </a:rPr>
+              <a:t>3. Left-Right Disparity Smoothness Loss</a:t>
+            </a:r>
+            <a:endParaRPr lang="en-US" altLang="en-GB" sz="2400" b="1">
+              <a:solidFill>
+                <a:srgbClr val="6AA84F"/>
+              </a:solidFill>
+            </a:endParaRPr>
+          </a:p>
+        </p:txBody>
+      </p:sp>
+    </p:spTree>
+  </p:cSld>
+  <p:clrMapOvr>
+    <a:masterClrMapping/>
+  </p:clrMapOvr>
+  <p:timing>
+    <p:tnLst>
+      <p:par>
+        <p:cTn id="1" dur="indefinite" restart="never" nodeType="tmRoot">
+          <p:childTnLst>
+            <p:seq concurrent="1" nextAc="seek">
+              <p:cTn id="2" dur="indefinite" nodeType="mainSeq">
+                <p:childTnLst>
+                  <p:par>
+                    <p:cTn id="3" fill="hold">
+                      <p:stCondLst>
+                        <p:cond delay="indefinite"/>
+                        <p:cond evt="onBegin" delay="0">
+                          <p:tn val="2"/>
+                        </p:cond>
+                      </p:stCondLst>
+                      <p:childTnLst>
+                        <p:par>
+                          <p:cTn id="4" fill="hold">
+                            <p:stCondLst>
+                              <p:cond delay="0"/>
+                            </p:stCondLst>
+                            <p:childTnLst>
+                              <p:par>
+                                <p:cTn id="5" presetID="1" presetClass="entr" presetSubtype="0" fill="hold" nodeType="withEffect">
+                                  <p:stCondLst>
+                                    <p:cond delay="0"/>
+                                  </p:stCondLst>
+                                  <p:childTnLst>
+                                    <p:set>
+                                      <p:cBhvr>
+                                        <p:cTn id="6" dur="1" fill="hold">
+                                          <p:stCondLst>
+                                            <p:cond delay="0"/>
+                                          </p:stCondLst>
+                                        </p:cTn>
+                                        <p:tgtEl>
+                                          <p:spTgt spid="6"/>
+                                        </p:tgtEl>
+                                        <p:attrNameLst>
+                                          <p:attrName>style.visibility</p:attrName>
+                                        </p:attrNameLst>
+                                      </p:cBhvr>
+                                      <p:to>
+                                        <p:strVal val="visible"/>
+                                      </p:to>
+                                    </p:set>
+                                  </p:childTnLst>
+                                </p:cTn>
+                              </p:par>
+                              <p:par>
+                                <p:cTn id="7" presetID="1" presetClass="entr" presetSubtype="0" fill="hold" nodeType="withEffect">
+                                  <p:stCondLst>
+                                    <p:cond delay="0"/>
+                                  </p:stCondLst>
+                                  <p:childTnLst>
+                                    <p:set>
+                                      <p:cBhvr>
+                                        <p:cTn id="8" dur="1" fill="hold">
+                                          <p:stCondLst>
+                                            <p:cond delay="0"/>
+                                          </p:stCondLst>
+                                        </p:cTn>
+                                        <p:tgtEl>
+                                          <p:spTgt spid="5"/>
+                                        </p:tgtEl>
+                                        <p:attrNameLst>
+                                          <p:attrName>style.visibility</p:attrName>
+                                        </p:attrNameLst>
+                                      </p:cBhvr>
+                                      <p:to>
+                                        <p:strVal val="visible"/>
+                                      </p:to>
+                                    </p:set>
+                                  </p:childTnLst>
+                                </p:cTn>
+                              </p:par>
+                              <p:par>
+                                <p:cTn id="9" presetID="1" presetClass="entr" presetSubtype="0" fill="hold" nodeType="withEffect">
+                                  <p:stCondLst>
+                                    <p:cond delay="0"/>
+                                  </p:stCondLst>
+                                  <p:childTnLst>
+                                    <p:set>
+                                      <p:cBhvr>
+                                        <p:cTn id="10" dur="1" fill="hold">
+                                          <p:stCondLst>
+                                            <p:cond delay="0"/>
+                                          </p:stCondLst>
+                                        </p:cTn>
+                                        <p:tgtEl>
+                                          <p:spTgt spid="7"/>
+                                        </p:tgtEl>
+                                        <p:attrNameLst>
+                                          <p:attrName>style.visibility</p:attrName>
+                                        </p:attrNameLst>
+                                      </p:cBhvr>
+                                      <p:to>
+                                        <p:strVal val="visible"/>
+                                      </p:to>
+                                    </p:set>
+                                  </p:childTnLst>
+                                </p:cTn>
+                              </p:par>
+                              <p:par>
+                                <p:cTn id="11" presetID="1" presetClass="entr" presetSubtype="0" fill="hold" grpId="0" nodeType="withEffect">
+                                  <p:stCondLst>
+                                    <p:cond delay="0"/>
+                                  </p:stCondLst>
+                                  <p:childTnLst>
+                                    <p:set>
+                                      <p:cBhvr>
+                                        <p:cTn id="12" dur="1" fill="hold">
+                                          <p:stCondLst>
+                                            <p:cond delay="0"/>
+                                          </p:stCondLst>
+                                        </p:cTn>
+                                        <p:tgtEl>
+                                          <p:spTgt spid="718"/>
+                                        </p:tgtEl>
+                                        <p:attrNameLst>
+                                          <p:attrName>style.visibility</p:attrName>
+                                        </p:attrNameLst>
+                                      </p:cBhvr>
+                                      <p:to>
+                                        <p:strVal val="visible"/>
+                                      </p:to>
+                                    </p:set>
+                                  </p:childTnLst>
+                                </p:cTn>
+                              </p:par>
+                              <p:par>
+                                <p:cTn id="13" presetID="1" presetClass="entr" presetSubtype="0" fill="hold" grpId="0" nodeType="withEffect">
+                                  <p:stCondLst>
+                                    <p:cond delay="0"/>
+                                  </p:stCondLst>
+                                  <p:childTnLst>
+                                    <p:set>
+                                      <p:cBhvr>
+                                        <p:cTn id="14" dur="1" fill="hold">
+                                          <p:stCondLst>
+                                            <p:cond delay="0"/>
+                                          </p:stCondLst>
+                                        </p:cTn>
+                                        <p:tgtEl>
+                                          <p:spTgt spid="10"/>
+                                        </p:tgtEl>
+                                        <p:attrNameLst>
+                                          <p:attrName>style.visibility</p:attrName>
+                                        </p:attrNameLst>
+                                      </p:cBhvr>
+                                      <p:to>
+                                        <p:strVal val="visible"/>
+                                      </p:to>
+                                    </p:set>
+                                  </p:childTnLst>
+                                </p:cTn>
+                              </p:par>
+                              <p:par>
+                                <p:cTn id="15" presetID="1" presetClass="entr" presetSubtype="0" fill="hold" grpId="0" nodeType="withEffect">
+                                  <p:stCondLst>
+                                    <p:cond delay="0"/>
+                                  </p:stCondLst>
+                                  <p:childTnLst>
+                                    <p:set>
+                                      <p:cBhvr>
+                                        <p:cTn id="16" dur="1" fill="hold">
+                                          <p:stCondLst>
+                                            <p:cond delay="0"/>
+                                          </p:stCondLst>
+                                        </p:cTn>
+                                        <p:tgtEl>
+                                          <p:spTgt spid="11"/>
+                                        </p:tgtEl>
+                                        <p:attrNameLst>
+                                          <p:attrName>style.visibility</p:attrName>
+                                        </p:attrNameLst>
+                                      </p:cBhvr>
+                                      <p:to>
+                                        <p:strVal val="visible"/>
+                                      </p:to>
+                                    </p:set>
+                                  </p:childTnLst>
+                                </p:cTn>
+                              </p:par>
+                            </p:childTnLst>
+                          </p:cTn>
+                        </p:par>
+                      </p:childTnLst>
+                    </p:cTn>
+                  </p:par>
+                </p:childTnLst>
+              </p:cTn>
+              <p:prevCondLst>
+                <p:cond evt="onPrev" delay="0">
+                  <p:tgtEl>
+                    <p:sldTgt/>
+                  </p:tgtEl>
+                </p:cond>
+              </p:prevCondLst>
+              <p:nextCondLst>
+                <p:cond evt="onNext" delay="0">
+                  <p:tgtEl>
+                    <p:sldTgt/>
+                  </p:tgtEl>
+                </p:cond>
+              </p:nextCondLst>
+            </p:seq>
+          </p:childTnLst>
+        </p:cTn>
+      </p:par>
+    </p:tnLst>
+    <p:bldLst>
+      <p:bldP spid="718" grpId="0"/>
+      <p:bldP spid="10" grpId="0"/>
+      <p:bldP spid="11" grpId="0"/>
+    </p:bldLst>
+  </p:timing>
+</p:sld>
+</file>
+
+<file path=ppt/slides/slide13.xml><?xml version="1.0" encoding="utf-8"?>
+<p:sld xmlns:a="http://schemas.openxmlformats.org/drawingml/2006/main" xmlns:r="http://schemas.openxmlformats.org/officeDocument/2006/relationships" xmlns:p="http://schemas.openxmlformats.org/presentationml/2006/main">
+  <p:cSld>
+    <p:spTree>
+      <p:nvGrpSpPr>
+        <p:cNvPr id="1" name=""/>
+        <p:cNvGrpSpPr/>
+        <p:nvPr/>
+      </p:nvGrpSpPr>
+      <p:grpSpPr>
+        <a:xfrm>
+          <a:off x="0" y="0"/>
+          <a:ext cx="0" cy="0"/>
+          <a:chOff x="0" y="0"/>
+          <a:chExt cx="0" cy="0"/>
+        </a:xfrm>
+      </p:grpSpPr>
+      <p:sp>
+        <p:nvSpPr>
+          <p:cNvPr id="2" name="Title 1"/>
+          <p:cNvSpPr>
+            <a:spLocks noGrp="1"/>
+          </p:cNvSpPr>
+          <p:nvPr>
+            <p:ph type="title"/>
+          </p:nvPr>
+        </p:nvSpPr>
+        <p:spPr/>
+        <p:txBody>
+          <a:bodyPr/>
+          <a:lstStyle/>
+          <a:p>
+            <a:r>
+              <a:rPr lang="en-US"/>
               <a:t>m1_2 digging into self_ supervised monocular depth prediction</a:t>
             </a:r>
             <a:endParaRPr lang="en-US"/>
@@ -4016,7 +5658,7 @@
 </p:sld>
 </file>
 
-<file path=ppt/slides/slide13.xml><?xml version="1.0" encoding="utf-8"?>
+<file path=ppt/slides/slide14.xml><?xml version="1.0" encoding="utf-8"?>
 <p:sld xmlns:a="http://schemas.openxmlformats.org/drawingml/2006/main" xmlns:r="http://schemas.openxmlformats.org/officeDocument/2006/relationships" xmlns:p="http://schemas.openxmlformats.org/presentationml/2006/main">
   <p:cSld>
     <p:spTree>
@@ -9886,8 +11528,8 @@
         </p:nvSpPr>
         <p:spPr>
           <a:xfrm>
-            <a:off x="6228370" y="4997372"/>
-            <a:ext cx="830100" cy="390000"/>
+            <a:off x="6238875" y="4997450"/>
+            <a:ext cx="960120" cy="389890"/>
           </a:xfrm>
           <a:prstGeom prst="rect">
             <a:avLst/>
@@ -10020,8 +11662,8 @@
         </p:nvSpPr>
         <p:spPr>
           <a:xfrm>
-            <a:off x="4967007" y="4997385"/>
-            <a:ext cx="965100" cy="390000"/>
+            <a:off x="4966970" y="4997450"/>
+            <a:ext cx="1045210" cy="389890"/>
           </a:xfrm>
           <a:prstGeom prst="rect">
             <a:avLst/>

</xml_diff>

<commit_message>
(no branch): Auto stash before rebase of "origin/master"
</commit_message>
<xml_diff>
--- a/meetings/2019_11_04_basic_papers/2019_11_04_basic_papers_v2.pptx
+++ b/meetings/2019_11_04_basic_papers/2019_11_04_basic_papers_v2.pptx
@@ -4788,6 +4788,47 @@
           </p:txBody>
         </p:sp>
       </p:grpSp>
+      <p:sp>
+        <p:nvSpPr>
+          <p:cNvPr id="3" name="Content Placeholder 2"/>
+          <p:cNvSpPr>
+            <a:spLocks noGrp="1"/>
+          </p:cNvSpPr>
+          <p:nvPr>
+            <p:ph idx="1"/>
+          </p:nvPr>
+        </p:nvSpPr>
+        <p:spPr/>
+        <p:txBody>
+          <a:bodyPr/>
+          <a:p>
+            <a:pPr marL="342900" indent="-342900">
+              <a:buFont typeface="Arial" panose="020B0604020202020204" pitchFamily="34" charset="0"/>
+              <a:buChar char="•"/>
+            </a:pPr>
+            <a:r>
+              <a:rPr lang="en-US"/>
+              <a:t>CNN</a:t>
+            </a:r>
+            <a:endParaRPr lang="en-US"/>
+          </a:p>
+          <a:p>
+            <a:pPr marL="342900" indent="-342900">
+              <a:buFont typeface="Arial" panose="020B0604020202020204" pitchFamily="34" charset="0"/>
+              <a:buChar char="•"/>
+            </a:pPr>
+            <a:r>
+              <a:rPr lang="en-US">
+                <a:sym typeface="+mn-ea"/>
+              </a:rPr>
+              <a:t>ENCODER DECODER</a:t>
+            </a:r>
+            <a:endParaRPr lang="en-US">
+              <a:sym typeface="+mn-ea"/>
+            </a:endParaRPr>
+          </a:p>
+        </p:txBody>
+      </p:sp>
     </p:spTree>
   </p:cSld>
   <p:clrMapOvr>

</xml_diff>

<commit_message>
updated presentation to m1_1
</commit_message>
<xml_diff>
--- a/meetings/2019_11_04_basic_papers/2019_11_04_basic_papers_v2.pptx
+++ b/meetings/2019_11_04_basic_papers/2019_11_04_basic_papers_v2.pptx
@@ -11,18 +11,19 @@
     <p:handoutMasterId r:id="rId18"/>
   </p:handoutMasterIdLst>
   <p:sldIdLst>
-    <p:sldId id="256" r:id="rId3"/>
-    <p:sldId id="257" r:id="rId4"/>
-    <p:sldId id="258" r:id="rId5"/>
-    <p:sldId id="264" r:id="rId6"/>
-    <p:sldId id="265" r:id="rId7"/>
-    <p:sldId id="259" r:id="rId8"/>
-    <p:sldId id="260" r:id="rId9"/>
-    <p:sldId id="261" r:id="rId10"/>
-    <p:sldId id="271" r:id="rId11"/>
-    <p:sldId id="277" r:id="rId12"/>
-    <p:sldId id="272" r:id="rId13"/>
-    <p:sldId id="273" r:id="rId14"/>
+    <p:sldId id="256" r:id="rId2"/>
+    <p:sldId id="257" r:id="rId3"/>
+    <p:sldId id="258" r:id="rId4"/>
+    <p:sldId id="264" r:id="rId5"/>
+    <p:sldId id="265" r:id="rId6"/>
+    <p:sldId id="259" r:id="rId7"/>
+    <p:sldId id="260" r:id="rId8"/>
+    <p:sldId id="261" r:id="rId9"/>
+    <p:sldId id="271" r:id="rId10"/>
+    <p:sldId id="277" r:id="rId11"/>
+    <p:sldId id="272" r:id="rId12"/>
+    <p:sldId id="273" r:id="rId13"/>
+    <p:sldId id="278" r:id="rId14"/>
     <p:sldId id="262" r:id="rId15"/>
     <p:sldId id="263" r:id="rId16"/>
   </p:sldIdLst>
@@ -153,6 +154,25 @@
       </a:defRPr>
     </a:lvl9pPr>
   </p:defaultTextStyle>
+  <p:extLst>
+    <p:ext uri="{EFAFB233-063F-42B5-8137-9DF3F51BA10A}">
+      <p15:sldGuideLst xmlns:p15="http://schemas.microsoft.com/office/powerpoint/2012/main">
+        <p15:guide id="1" orient="horz" pos="2159">
+          <p15:clr>
+            <a:srgbClr val="A4A3A4"/>
+          </p15:clr>
+        </p15:guide>
+        <p15:guide id="2" pos="2841">
+          <p15:clr>
+            <a:srgbClr val="A4A3A4"/>
+          </p15:clr>
+        </p15:guide>
+      </p15:sldGuideLst>
+    </p:ext>
+    <p:ext uri="{2D200454-40CA-4A62-9FC3-DE9A4176ACB9}">
+      <p15:notesGuideLst xmlns:p15="http://schemas.microsoft.com/office/powerpoint/2012/main"/>
+    </p:ext>
+  </p:extLst>
 </p:presentation>
 </file>
 
@@ -260,6 +280,7 @@
           <a:p>
             <a:fld id="{A32DC80D-291A-4ABB-A78B-0417274A267C}" type="datetime4">
               <a:rPr lang="de-DE"/>
+              <a:t>4. November 2019</a:t>
             </a:fld>
             <a:endParaRPr lang="de-DE"/>
           </a:p>
@@ -304,7 +325,6 @@
               <a:rPr lang="de-DE"/>
               <a:t>|  </a:t>
             </a:r>
-            <a:endParaRPr lang="de-DE"/>
           </a:p>
         </p:txBody>
       </p:sp>
@@ -349,6 +369,7 @@
             </a:r>
             <a:fld id="{C7CC2173-B0D1-45F1-9D54-E33B7353DA19}" type="slidenum">
               <a:rPr lang="de-DE"/>
+              <a:t>‹Nr.›</a:t>
             </a:fld>
             <a:endParaRPr lang="de-DE"/>
           </a:p>
@@ -363,7 +384,7 @@
           <p:nvPr/>
         </p:nvPicPr>
         <p:blipFill>
-          <a:blip r:embed="rId1" cstate="print"/>
+          <a:blip r:embed="rId2" cstate="print"/>
           <a:srcRect/>
           <a:stretch>
             <a:fillRect/>
@@ -552,7 +573,7 @@
           <p:nvPr/>
         </p:nvPicPr>
         <p:blipFill>
-          <a:blip r:embed="rId1"/>
+          <a:blip r:embed="rId2"/>
           <a:srcRect/>
           <a:stretch>
             <a:fillRect/>
@@ -609,6 +630,7 @@
           <a:p>
             <a:fld id="{065B079B-E513-489A-8A1B-D7C78493EA86}" type="datetime4">
               <a:rPr lang="de-DE"/>
+              <a:t>4. November 2019</a:t>
             </a:fld>
             <a:endParaRPr lang="de-DE"/>
           </a:p>
@@ -676,7 +698,6 @@
               <a:rPr lang="de-DE"/>
               <a:t>Textmasterformate durch Klicken bearbeiten</a:t>
             </a:r>
-            <a:endParaRPr lang="de-DE"/>
           </a:p>
           <a:p>
             <a:pPr lvl="1"/>
@@ -684,7 +705,6 @@
               <a:rPr lang="de-DE"/>
               <a:t>Zweite Ebene</a:t>
             </a:r>
-            <a:endParaRPr lang="de-DE"/>
           </a:p>
           <a:p>
             <a:pPr lvl="2"/>
@@ -692,7 +712,6 @@
               <a:rPr lang="de-DE"/>
               <a:t>Dritte Ebene</a:t>
             </a:r>
-            <a:endParaRPr lang="de-DE"/>
           </a:p>
           <a:p>
             <a:pPr lvl="3"/>
@@ -700,7 +719,6 @@
               <a:rPr lang="de-DE"/>
               <a:t>Vierte Ebene</a:t>
             </a:r>
-            <a:endParaRPr lang="de-DE"/>
           </a:p>
           <a:p>
             <a:pPr lvl="4"/>
@@ -708,7 +726,6 @@
               <a:rPr lang="de-DE"/>
               <a:t>Fünfte Ebene</a:t>
             </a:r>
-            <a:endParaRPr lang="de-DE"/>
           </a:p>
         </p:txBody>
       </p:sp>
@@ -754,7 +771,6 @@
               <a:rPr lang="de-DE"/>
               <a:t>|  </a:t>
             </a:r>
-            <a:endParaRPr lang="de-DE"/>
           </a:p>
         </p:txBody>
       </p:sp>
@@ -802,6 +818,7 @@
             </a:r>
             <a:fld id="{C36AA9A4-5D0B-4134-89A6-D8B9DAA4F25C}" type="slidenum">
               <a:rPr lang="de-DE"/>
+              <a:t>‹Nr.›</a:t>
             </a:fld>
             <a:endParaRPr lang="de-DE"/>
           </a:p>
@@ -1140,7 +1157,7 @@
 </file>
 
 <file path=ppt/slideLayouts/slideLayout1.xml><?xml version="1.0" encoding="utf-8"?>
-<p:sldLayout xmlns:a="http://schemas.openxmlformats.org/drawingml/2006/main" xmlns:r="http://schemas.openxmlformats.org/officeDocument/2006/relationships" xmlns:p="http://schemas.openxmlformats.org/presentationml/2006/main" preserve="1" showMasterSp="0" userDrawn="1">
+<p:sldLayout xmlns:a="http://schemas.openxmlformats.org/drawingml/2006/main" xmlns:r="http://schemas.openxmlformats.org/officeDocument/2006/relationships" xmlns:p="http://schemas.openxmlformats.org/presentationml/2006/main" showMasterSp="0" preserve="1" userDrawn="1">
   <p:cSld name="Titelfolie">
     <p:spTree>
       <p:nvGrpSpPr>
@@ -1227,7 +1244,6 @@
               <a:rPr lang="de-DE" dirty="0"/>
               <a:t>Formatvorlage des Untertitelmasters durch Klicken bearbeiten</a:t>
             </a:r>
-            <a:endParaRPr lang="de-DE" dirty="0"/>
           </a:p>
         </p:txBody>
       </p:sp>
@@ -1420,7 +1436,6 @@
               <a:rPr lang="de-DE" dirty="0"/>
               <a:t>Titelmasterformat durch Klicken bearbeiten</a:t>
             </a:r>
-            <a:endParaRPr lang="de-DE" dirty="0"/>
           </a:p>
         </p:txBody>
       </p:sp>
@@ -1478,6 +1493,7 @@
                 <a:ea typeface="+mn-ea"/>
                 <a:cs typeface="Tahoma" panose="020B0604030504040204" pitchFamily="34" charset="0"/>
               </a:rPr>
+              <a:t>04.11.2019</a:t>
             </a:fld>
             <a:r>
               <a:rPr kumimoji="0" lang="de-DE" sz="1000" b="0" i="0" u="none" strike="noStrike" kern="1200" cap="none" spc="0" normalizeH="0" baseline="0" noProof="0" dirty="0">
@@ -1610,6 +1626,7 @@
                 <a:cs typeface="Tahoma" panose="020B0604030504040204" pitchFamily="34" charset="0"/>
                 <a:sym typeface="+mn-ea"/>
               </a:rPr>
+              <a:t>‹Nr.›</a:t>
             </a:fld>
             <a:endParaRPr kumimoji="0" lang="de-DE" sz="1000" b="0" i="0" u="none" strike="noStrike" kern="1200" cap="none" spc="0" normalizeH="0" baseline="0" noProof="0" dirty="0">
               <a:ln>
@@ -1728,7 +1745,6 @@
               <a:rPr lang="de-DE"/>
               <a:t>Titelmasterformat durch Klicken bearbeiten</a:t>
             </a:r>
-            <a:endParaRPr lang="de-DE"/>
           </a:p>
         </p:txBody>
       </p:sp>
@@ -1757,7 +1773,6 @@
               <a:rPr lang="de-DE" dirty="0"/>
               <a:t>Textmasterformate durch Klicken bearbeiten</a:t>
             </a:r>
-            <a:endParaRPr lang="de-DE" dirty="0"/>
           </a:p>
           <a:p>
             <a:pPr lvl="1"/>
@@ -1765,7 +1780,6 @@
               <a:rPr lang="de-DE" dirty="0"/>
               <a:t>Zweite Ebene</a:t>
             </a:r>
-            <a:endParaRPr lang="de-DE" dirty="0"/>
           </a:p>
           <a:p>
             <a:pPr lvl="2"/>
@@ -1773,7 +1787,6 @@
               <a:rPr lang="de-DE" dirty="0"/>
               <a:t>Dritte Ebene</a:t>
             </a:r>
-            <a:endParaRPr lang="de-DE" dirty="0"/>
           </a:p>
           <a:p>
             <a:pPr lvl="3"/>
@@ -1781,7 +1794,6 @@
               <a:rPr lang="de-DE" dirty="0"/>
               <a:t>Vierte Ebene</a:t>
             </a:r>
-            <a:endParaRPr lang="de-DE" dirty="0"/>
           </a:p>
           <a:p>
             <a:pPr lvl="4"/>
@@ -1789,7 +1801,6 @@
               <a:rPr lang="de-DE" dirty="0"/>
               <a:t>Fünfte Ebene</a:t>
             </a:r>
-            <a:endParaRPr lang="de-DE" dirty="0"/>
           </a:p>
         </p:txBody>
       </p:sp>
@@ -1846,7 +1857,6 @@
               <a:rPr lang="de-DE" dirty="0"/>
               <a:t>Titelmasterformat durch Klicken bearbeiten</a:t>
             </a:r>
-            <a:endParaRPr lang="de-DE" dirty="0"/>
           </a:p>
         </p:txBody>
       </p:sp>
@@ -1912,7 +1922,6 @@
               <a:rPr lang="de-DE"/>
               <a:t>Textmasterformate durch Klicken bearbeiten</a:t>
             </a:r>
-            <a:endParaRPr lang="de-DE"/>
           </a:p>
         </p:txBody>
       </p:sp>
@@ -1960,7 +1969,6 @@
               <a:rPr lang="de-DE"/>
               <a:t>Titelmasterformat durch Klicken bearbeiten</a:t>
             </a:r>
-            <a:endParaRPr lang="de-DE"/>
           </a:p>
         </p:txBody>
       </p:sp>
@@ -2017,7 +2025,6 @@
               <a:rPr lang="de-DE" dirty="0"/>
               <a:t>Textmasterformate durch Klicken bearbeiten</a:t>
             </a:r>
-            <a:endParaRPr lang="de-DE" dirty="0"/>
           </a:p>
           <a:p>
             <a:pPr lvl="1"/>
@@ -2025,7 +2032,6 @@
               <a:rPr lang="de-DE" dirty="0"/>
               <a:t>Zweite Ebene</a:t>
             </a:r>
-            <a:endParaRPr lang="de-DE" dirty="0"/>
           </a:p>
           <a:p>
             <a:pPr lvl="2"/>
@@ -2033,7 +2039,6 @@
               <a:rPr lang="de-DE" dirty="0"/>
               <a:t>Dritte Ebene</a:t>
             </a:r>
-            <a:endParaRPr lang="de-DE" dirty="0"/>
           </a:p>
           <a:p>
             <a:pPr lvl="3"/>
@@ -2041,7 +2046,6 @@
               <a:rPr lang="de-DE" dirty="0"/>
               <a:t>Vierte Ebene</a:t>
             </a:r>
-            <a:endParaRPr lang="de-DE" dirty="0"/>
           </a:p>
           <a:p>
             <a:pPr lvl="4"/>
@@ -2049,7 +2053,6 @@
               <a:rPr lang="de-DE" dirty="0"/>
               <a:t>Fünfte Ebene</a:t>
             </a:r>
-            <a:endParaRPr lang="de-DE" dirty="0"/>
           </a:p>
         </p:txBody>
       </p:sp>
@@ -2106,7 +2109,6 @@
               <a:rPr lang="de-DE" dirty="0"/>
               <a:t>Textmasterformate durch Klicken bearbeiten</a:t>
             </a:r>
-            <a:endParaRPr lang="de-DE" dirty="0"/>
           </a:p>
           <a:p>
             <a:pPr lvl="1"/>
@@ -2114,7 +2116,6 @@
               <a:rPr lang="de-DE" dirty="0"/>
               <a:t>Zweite Ebene</a:t>
             </a:r>
-            <a:endParaRPr lang="de-DE" dirty="0"/>
           </a:p>
           <a:p>
             <a:pPr lvl="2"/>
@@ -2122,7 +2123,6 @@
               <a:rPr lang="de-DE" dirty="0"/>
               <a:t>Dritte Ebene</a:t>
             </a:r>
-            <a:endParaRPr lang="de-DE" dirty="0"/>
           </a:p>
           <a:p>
             <a:pPr lvl="3"/>
@@ -2130,7 +2130,6 @@
               <a:rPr lang="de-DE" dirty="0"/>
               <a:t>Vierte Ebene</a:t>
             </a:r>
-            <a:endParaRPr lang="de-DE" dirty="0"/>
           </a:p>
           <a:p>
             <a:pPr lvl="4"/>
@@ -2138,7 +2137,6 @@
               <a:rPr lang="de-DE" dirty="0"/>
               <a:t>Fünfte Ebene</a:t>
             </a:r>
-            <a:endParaRPr lang="de-DE" dirty="0"/>
           </a:p>
         </p:txBody>
       </p:sp>
@@ -2186,7 +2184,6 @@
               <a:rPr lang="de-DE" dirty="0"/>
               <a:t>Titelmasterformat durch Klicken bearbeiten</a:t>
             </a:r>
-            <a:endParaRPr lang="de-DE" dirty="0"/>
           </a:p>
         </p:txBody>
       </p:sp>
@@ -2293,7 +2290,6 @@
               <a:rPr lang="de-DE" dirty="0"/>
               <a:t>Textmasterformate durch Klicken bearbeiten</a:t>
             </a:r>
-            <a:endParaRPr lang="de-DE" dirty="0"/>
           </a:p>
           <a:p>
             <a:pPr lvl="1"/>
@@ -2301,7 +2297,6 @@
               <a:rPr lang="de-DE" dirty="0"/>
               <a:t>Zweite Ebene</a:t>
             </a:r>
-            <a:endParaRPr lang="de-DE" dirty="0"/>
           </a:p>
           <a:p>
             <a:pPr lvl="2"/>
@@ -2309,7 +2304,6 @@
               <a:rPr lang="de-DE" dirty="0"/>
               <a:t>Dritte Ebene</a:t>
             </a:r>
-            <a:endParaRPr lang="de-DE" dirty="0"/>
           </a:p>
           <a:p>
             <a:pPr lvl="3"/>
@@ -2317,7 +2311,6 @@
               <a:rPr lang="de-DE" dirty="0"/>
               <a:t>Vierte Ebene</a:t>
             </a:r>
-            <a:endParaRPr lang="de-DE" dirty="0"/>
           </a:p>
           <a:p>
             <a:pPr lvl="4"/>
@@ -2325,7 +2318,6 @@
               <a:rPr lang="de-DE" dirty="0"/>
               <a:t>Fünfte Ebene</a:t>
             </a:r>
-            <a:endParaRPr lang="de-DE" dirty="0"/>
           </a:p>
         </p:txBody>
       </p:sp>
@@ -2391,7 +2383,6 @@
               <a:rPr lang="de-DE" dirty="0"/>
               <a:t>Textmasterformate durch Klicken bearbeiten</a:t>
             </a:r>
-            <a:endParaRPr lang="de-DE" dirty="0"/>
           </a:p>
         </p:txBody>
       </p:sp>
@@ -2419,7 +2410,6 @@
               <a:rPr lang="de-DE"/>
               <a:t>Titelmasterformat durch Klicken bearbeiten</a:t>
             </a:r>
-            <a:endParaRPr lang="de-DE"/>
           </a:p>
         </p:txBody>
       </p:sp>
@@ -2476,7 +2466,6 @@
               <a:rPr lang="de-DE"/>
               <a:t>Titelmasterformat durch Klicken bearbeiten</a:t>
             </a:r>
-            <a:endParaRPr lang="de-DE"/>
           </a:p>
         </p:txBody>
       </p:sp>
@@ -2541,7 +2530,6 @@
               <a:rPr lang="de-DE"/>
               <a:t>Bild durch Klicken auf Symbol hinzufügen</a:t>
             </a:r>
-            <a:endParaRPr lang="de-DE"/>
           </a:p>
         </p:txBody>
       </p:sp>
@@ -2607,7 +2595,6 @@
               <a:rPr lang="de-DE"/>
               <a:t>Textmasterformate durch Klicken bearbeiten</a:t>
             </a:r>
-            <a:endParaRPr lang="de-DE"/>
           </a:p>
         </p:txBody>
       </p:sp>
@@ -2712,7 +2699,6 @@
               <a:rPr lang="de-DE" dirty="0"/>
               <a:t>Titelmasterformat durch Klicken bearbeiten</a:t>
             </a:r>
-            <a:endParaRPr lang="de-DE" dirty="0"/>
           </a:p>
         </p:txBody>
       </p:sp>
@@ -2750,7 +2736,6 @@
               <a:rPr lang="de-DE" dirty="0"/>
               <a:t>Textmasterformate durch Klicken bearbeiten</a:t>
             </a:r>
-            <a:endParaRPr lang="de-DE" dirty="0"/>
           </a:p>
           <a:p>
             <a:pPr lvl="1"/>
@@ -2758,7 +2743,6 @@
               <a:rPr lang="de-DE" dirty="0"/>
               <a:t>Zweite Ebene</a:t>
             </a:r>
-            <a:endParaRPr lang="de-DE" dirty="0"/>
           </a:p>
           <a:p>
             <a:pPr lvl="2"/>
@@ -2766,7 +2750,6 @@
               <a:rPr lang="de-DE" dirty="0"/>
               <a:t>Dritte Ebene</a:t>
             </a:r>
-            <a:endParaRPr lang="de-DE" dirty="0"/>
           </a:p>
           <a:p>
             <a:pPr lvl="3"/>
@@ -2774,7 +2757,6 @@
               <a:rPr lang="de-DE" dirty="0"/>
               <a:t>Vierte Ebene</a:t>
             </a:r>
-            <a:endParaRPr lang="de-DE" dirty="0"/>
           </a:p>
           <a:p>
             <a:pPr lvl="4"/>
@@ -2782,7 +2764,6 @@
               <a:rPr lang="de-DE" dirty="0"/>
               <a:t>Fünfte Ebene</a:t>
             </a:r>
-            <a:endParaRPr lang="de-DE" dirty="0"/>
           </a:p>
         </p:txBody>
       </p:sp>
@@ -2830,7 +2811,7 @@
           <p:nvPr/>
         </p:nvPicPr>
         <p:blipFill>
-          <a:blip r:embed="rId9" cstate="print"/>
+          <a:blip r:embed="rId10" cstate="print"/>
           <a:srcRect r="5453"/>
           <a:stretch>
             <a:fillRect/>
@@ -3013,6 +2994,7 @@
                 <a:ea typeface="+mn-ea"/>
                 <a:cs typeface="Tahoma" panose="020B0604030504040204" pitchFamily="34" charset="0"/>
               </a:rPr>
+              <a:t>04.11.2019</a:t>
             </a:fld>
             <a:r>
               <a:rPr kumimoji="0" lang="de-DE" sz="1000" b="0" i="0" u="none" strike="noStrike" kern="1200" cap="none" spc="0" normalizeH="0" baseline="0" noProof="0" dirty="0">
@@ -3173,6 +3155,7 @@
                 <a:ea typeface="+mn-ea"/>
                 <a:cs typeface="Tahoma" panose="020B0604030504040204" pitchFamily="34" charset="0"/>
               </a:rPr>
+              <a:t>‹Nr.›</a:t>
             </a:fld>
             <a:endParaRPr kumimoji="0" lang="de-DE" sz="1000" b="0" i="0" u="none" strike="noStrike" kern="1200" cap="none" spc="0" normalizeH="0" baseline="0" noProof="0" dirty="0">
               <a:ln>
@@ -3232,7 +3215,7 @@
           <p:nvPr userDrawn="1"/>
         </p:nvPicPr>
         <p:blipFill>
-          <a:blip r:embed="rId10"/>
+          <a:blip r:embed="rId11"/>
           <a:stretch>
             <a:fillRect/>
           </a:stretch>
@@ -3699,7 +3682,6 @@
               <a:rPr lang="en-US" altLang="de-DE" dirty="0"/>
               <a:t>Weekly Topic: Grasb the idea of s.o.t.a literature</a:t>
             </a:r>
-            <a:endParaRPr lang="en-US" altLang="de-DE" dirty="0"/>
           </a:p>
         </p:txBody>
       </p:sp>
@@ -3734,7 +3716,6 @@
               <a:rPr lang="en-US" altLang="de-DE" dirty="0"/>
               <a:t>Piecewise monocular depth estimation by plane fitting</a:t>
             </a:r>
-            <a:endParaRPr lang="en-US" altLang="de-DE" dirty="0"/>
           </a:p>
         </p:txBody>
       </p:sp>
@@ -3747,7 +3728,7 @@
           <p:nvPr/>
         </p:nvPicPr>
         <p:blipFill>
-          <a:blip r:embed="rId1"/>
+          <a:blip r:embed="rId2"/>
           <a:stretch>
             <a:fillRect/>
           </a:stretch>
@@ -3779,7 +3760,7 @@
           <p:nvPr/>
         </p:nvPicPr>
         <p:blipFill>
-          <a:blip r:embed="rId2"/>
+          <a:blip r:embed="rId3"/>
           <a:stretch>
             <a:fillRect/>
           </a:stretch>
@@ -3845,7 +3826,6 @@
               <a:rPr lang="en-US"/>
               <a:t>related literature</a:t>
             </a:r>
-            <a:endParaRPr lang="en-US"/>
           </a:p>
         </p:txBody>
       </p:sp>
@@ -3869,17 +3849,80 @@
               <a:buChar char="•"/>
             </a:pPr>
             <a:r>
-              <a:rPr lang="en-US"/>
-              <a:t>architecture inspired by DispNET,</a:t>
+              <a:rPr lang="en-US" dirty="0"/>
+              <a:t>architecture inspired by </a:t>
+            </a:r>
+            <a:r>
+              <a:rPr lang="en-US" dirty="0" err="1" smtClean="0"/>
+              <a:t>DispNET</a:t>
+            </a:r>
+            <a:r>
+              <a:rPr lang="en-US" dirty="0" smtClean="0"/>
+              <a:t> (</a:t>
+            </a:r>
+            <a:r>
+              <a:rPr lang="en-US" dirty="0" err="1" smtClean="0"/>
+              <a:t>procudes</a:t>
+            </a:r>
+            <a:r>
+              <a:rPr lang="en-US" dirty="0" smtClean="0"/>
+              <a:t> correspondence field between </a:t>
+            </a:r>
+            <a:r>
+              <a:rPr lang="en-US" smtClean="0"/>
+              <a:t>two images),</a:t>
+            </a:r>
+            <a:r>
+              <a:rPr lang="en-US" dirty="0"/>
+              <a:t/>
             </a:r>
             <a:br>
-              <a:rPr lang="en-US"/>
+              <a:rPr lang="en-US" dirty="0"/>
             </a:br>
             <a:r>
-              <a:rPr lang="en-US" sz="900"/>
-              <a:t>N. Mayer, E. Ilg, P. H¨ausser, P. Fischer, D. Cremers, A. Dosovitskiy, and T. Brox. A large dataset to train convolutional networks for disparity, optical flow, and scene flow estimation</a:t>
-            </a:r>
-            <a:endParaRPr lang="en-US" sz="900"/>
+              <a:rPr lang="en-US" sz="900" dirty="0"/>
+              <a:t>N. Mayer, E. </a:t>
+            </a:r>
+            <a:r>
+              <a:rPr lang="en-US" sz="900" dirty="0" err="1"/>
+              <a:t>Ilg</a:t>
+            </a:r>
+            <a:r>
+              <a:rPr lang="en-US" sz="900" dirty="0"/>
+              <a:t>, P. </a:t>
+            </a:r>
+            <a:r>
+              <a:rPr lang="en-US" sz="900" dirty="0" err="1"/>
+              <a:t>H¨ausser</a:t>
+            </a:r>
+            <a:r>
+              <a:rPr lang="en-US" sz="900" dirty="0"/>
+              <a:t>, P. Fischer, D. </a:t>
+            </a:r>
+            <a:r>
+              <a:rPr lang="en-US" sz="900" dirty="0" err="1"/>
+              <a:t>Cremers</a:t>
+            </a:r>
+            <a:r>
+              <a:rPr lang="en-US" sz="900" dirty="0"/>
+              <a:t>, A. </a:t>
+            </a:r>
+            <a:r>
+              <a:rPr lang="en-US" sz="900" dirty="0" err="1"/>
+              <a:t>Dosovitskiy</a:t>
+            </a:r>
+            <a:r>
+              <a:rPr lang="en-US" sz="900" dirty="0"/>
+              <a:t>, and T. </a:t>
+            </a:r>
+            <a:r>
+              <a:rPr lang="en-US" sz="900" dirty="0" err="1"/>
+              <a:t>Brox</a:t>
+            </a:r>
+            <a:r>
+              <a:rPr lang="en-US" sz="900" dirty="0"/>
+              <a:t>. A large dataset to train convolutional networks for disparity, optical flow, and scene flow estimation</a:t>
+            </a:r>
           </a:p>
           <a:p>
             <a:pPr marL="342900" indent="-342900">
@@ -3887,23 +3930,59 @@
               <a:buChar char="•"/>
             </a:pPr>
             <a:r>
-              <a:rPr lang="en-US">
+              <a:rPr lang="en-US" dirty="0">
                 <a:sym typeface="+mn-ea"/>
               </a:rPr>
               <a:t>image sampler by spatial network transformer,</a:t>
             </a:r>
             <a:br>
-              <a:rPr lang="en-US">
+              <a:rPr lang="en-US" dirty="0">
                 <a:sym typeface="+mn-ea"/>
               </a:rPr>
             </a:br>
             <a:r>
-              <a:rPr lang="en-US" sz="900">
+              <a:rPr lang="en-US" sz="900" dirty="0">
                 <a:sym typeface="+mn-ea"/>
               </a:rPr>
-              <a:t>M. Jaderberg, K. Simonyan, A. Zisserman, and K. Kavukcuoglu. Spatial transformer networks. In NIPS, 2015</a:t>
-            </a:r>
-            <a:endParaRPr lang="en-US">
+              <a:t>M. </a:t>
+            </a:r>
+            <a:r>
+              <a:rPr lang="en-US" sz="900" dirty="0" err="1">
+                <a:sym typeface="+mn-ea"/>
+              </a:rPr>
+              <a:t>Jaderberg</a:t>
+            </a:r>
+            <a:r>
+              <a:rPr lang="en-US" sz="900" dirty="0">
+                <a:sym typeface="+mn-ea"/>
+              </a:rPr>
+              <a:t>, K. </a:t>
+            </a:r>
+            <a:r>
+              <a:rPr lang="en-US" sz="900" dirty="0" err="1">
+                <a:sym typeface="+mn-ea"/>
+              </a:rPr>
+              <a:t>Simonyan</a:t>
+            </a:r>
+            <a:r>
+              <a:rPr lang="en-US" sz="900" dirty="0">
+                <a:sym typeface="+mn-ea"/>
+              </a:rPr>
+              <a:t>, A. Zisserman, and K. </a:t>
+            </a:r>
+            <a:r>
+              <a:rPr lang="en-US" sz="900" dirty="0" err="1">
+                <a:sym typeface="+mn-ea"/>
+              </a:rPr>
+              <a:t>Kavukcuoglu</a:t>
+            </a:r>
+            <a:r>
+              <a:rPr lang="en-US" sz="900" dirty="0">
+                <a:sym typeface="+mn-ea"/>
+              </a:rPr>
+              <a:t>. Spatial transformer networks. In NIPS, 2015</a:t>
+            </a:r>
+            <a:endParaRPr lang="en-US" dirty="0">
               <a:sym typeface="+mn-ea"/>
             </a:endParaRPr>
           </a:p>
@@ -3913,23 +3992,164 @@
               <a:buChar char="•"/>
             </a:pPr>
             <a:r>
-              <a:rPr lang="en-US">
+              <a:rPr lang="en-US" dirty="0">
                 <a:sym typeface="+mn-ea"/>
               </a:rPr>
               <a:t>Encoder Decoder structure  by </a:t>
             </a:r>
             <a:br>
-              <a:rPr lang="en-US">
+              <a:rPr lang="en-US" dirty="0">
                 <a:sym typeface="+mn-ea"/>
               </a:rPr>
             </a:br>
             <a:r>
-              <a:rPr lang="en-US" sz="900">
+              <a:rPr lang="en-US" sz="900" dirty="0">
                 <a:sym typeface="+mn-ea"/>
               </a:rPr>
-              <a:t>V. Patraucean, A. Handa, and R. Cipolla. Spatio-temporal video autoencoder with differentiable memory. arXiv preprint arXiv:1511.06309, 2015</a:t>
-            </a:r>
-            <a:endParaRPr lang="en-US">
+              <a:t>V. </a:t>
+            </a:r>
+            <a:r>
+              <a:rPr lang="en-US" sz="900" dirty="0" err="1">
+                <a:sym typeface="+mn-ea"/>
+              </a:rPr>
+              <a:t>Patraucean</a:t>
+            </a:r>
+            <a:r>
+              <a:rPr lang="en-US" sz="900" dirty="0">
+                <a:sym typeface="+mn-ea"/>
+              </a:rPr>
+              <a:t>, A. </a:t>
+            </a:r>
+            <a:r>
+              <a:rPr lang="en-US" sz="900" dirty="0" err="1">
+                <a:sym typeface="+mn-ea"/>
+              </a:rPr>
+              <a:t>Handa</a:t>
+            </a:r>
+            <a:r>
+              <a:rPr lang="en-US" sz="900" dirty="0">
+                <a:sym typeface="+mn-ea"/>
+              </a:rPr>
+              <a:t>, and R. </a:t>
+            </a:r>
+            <a:r>
+              <a:rPr lang="en-US" sz="900" dirty="0" err="1">
+                <a:sym typeface="+mn-ea"/>
+              </a:rPr>
+              <a:t>Cipolla</a:t>
+            </a:r>
+            <a:r>
+              <a:rPr lang="en-US" sz="900" dirty="0">
+                <a:sym typeface="+mn-ea"/>
+              </a:rPr>
+              <a:t>. </a:t>
+            </a:r>
+            <a:r>
+              <a:rPr lang="en-US" sz="900" dirty="0" err="1">
+                <a:sym typeface="+mn-ea"/>
+              </a:rPr>
+              <a:t>Spatio</a:t>
+            </a:r>
+            <a:r>
+              <a:rPr lang="en-US" sz="900" dirty="0">
+                <a:sym typeface="+mn-ea"/>
+              </a:rPr>
+              <a:t>-temporal video </a:t>
+            </a:r>
+            <a:r>
+              <a:rPr lang="en-US" sz="900" dirty="0" err="1">
+                <a:sym typeface="+mn-ea"/>
+              </a:rPr>
+              <a:t>autoencoder</a:t>
+            </a:r>
+            <a:r>
+              <a:rPr lang="en-US" sz="900" dirty="0">
+                <a:sym typeface="+mn-ea"/>
+              </a:rPr>
+              <a:t> with differentiable memory. </a:t>
+            </a:r>
+            <a:r>
+              <a:rPr lang="en-US" sz="900" dirty="0" err="1">
+                <a:sym typeface="+mn-ea"/>
+              </a:rPr>
+              <a:t>arXiv</a:t>
+            </a:r>
+            <a:r>
+              <a:rPr lang="en-US" sz="900" dirty="0">
+                <a:sym typeface="+mn-ea"/>
+              </a:rPr>
+              <a:t> preprint arXiv:1511.06309, </a:t>
+            </a:r>
+            <a:r>
+              <a:rPr lang="en-US" sz="900" dirty="0" smtClean="0">
+                <a:sym typeface="+mn-ea"/>
+              </a:rPr>
+              <a:t>2015</a:t>
+            </a:r>
+          </a:p>
+          <a:p>
+            <a:pPr marL="342900" indent="-342900">
+              <a:buFont typeface="Arial" panose="020B0604020202020204" pitchFamily="34" charset="0"/>
+              <a:buChar char="•"/>
+            </a:pPr>
+            <a:r>
+              <a:rPr lang="en-US" dirty="0" smtClean="0">
+                <a:sym typeface="+mn-ea"/>
+              </a:rPr>
+              <a:t>Generate </a:t>
+            </a:r>
+            <a:r>
+              <a:rPr lang="en-US" dirty="0"/>
+              <a:t>corresponding right view from an input left image</a:t>
+            </a:r>
+            <a:br>
+              <a:rPr lang="en-US" dirty="0"/>
+            </a:br>
+            <a:r>
+              <a:rPr lang="en-US" sz="900" dirty="0"/>
+              <a:t>J. </a:t>
+            </a:r>
+            <a:r>
+              <a:rPr lang="en-US" sz="900" dirty="0" err="1"/>
+              <a:t>Xie</a:t>
+            </a:r>
+            <a:r>
+              <a:rPr lang="en-US" sz="900" dirty="0"/>
+              <a:t>, R. </a:t>
+            </a:r>
+            <a:r>
+              <a:rPr lang="en-US" sz="900" dirty="0" err="1"/>
+              <a:t>Girshick</a:t>
+            </a:r>
+            <a:r>
+              <a:rPr lang="en-US" sz="900" dirty="0"/>
+              <a:t>, and A. </a:t>
+            </a:r>
+            <a:r>
+              <a:rPr lang="en-US" sz="900" dirty="0" err="1"/>
+              <a:t>Farhadi</a:t>
+            </a:r>
+            <a:r>
+              <a:rPr lang="en-US" sz="900" dirty="0"/>
+              <a:t>. Deep3d: Fully </a:t>
+            </a:r>
+            <a:r>
+              <a:rPr lang="en-US" sz="900" dirty="0" smtClean="0"/>
+              <a:t>automatic 2d-to-3d </a:t>
+            </a:r>
+            <a:r>
+              <a:rPr lang="en-US" sz="900" dirty="0"/>
+              <a:t>video conversion with deep convolutional </a:t>
+            </a:r>
+            <a:r>
+              <a:rPr lang="en-US" sz="900" dirty="0" smtClean="0"/>
+              <a:t>neural networks</a:t>
+            </a:r>
+            <a:r>
+              <a:rPr lang="en-US" sz="900" dirty="0"/>
+              <a:t>. In ECCV, 2016.</a:t>
+            </a:r>
+            <a:endParaRPr lang="en-US" sz="900" dirty="0" smtClean="0">
               <a:sym typeface="+mn-ea"/>
             </a:endParaRPr>
           </a:p>
@@ -3938,7 +4158,7 @@
               <a:buFont typeface="Arial" panose="020B0604020202020204" pitchFamily="34" charset="0"/>
               <a:buChar char="•"/>
             </a:pPr>
-            <a:endParaRPr lang="en-US">
+            <a:endParaRPr lang="en-US" sz="900" dirty="0">
               <a:sym typeface="+mn-ea"/>
             </a:endParaRPr>
           </a:p>
@@ -3995,7 +4215,6 @@
               <a:rPr lang="en-US"/>
               <a:t>architecture</a:t>
             </a:r>
-            <a:endParaRPr lang="en-US"/>
           </a:p>
         </p:txBody>
       </p:sp>
@@ -4053,6 +4272,7 @@
           </p:style>
           <p:txBody>
             <a:bodyPr rtlCol="0" anchor="ctr"/>
+            <a:lstStyle/>
             <a:p>
               <a:pPr algn="ctr"/>
               <a:endParaRPr lang="en-US"/>
@@ -4096,6 +4316,7 @@
           </p:style>
           <p:txBody>
             <a:bodyPr rtlCol="0" anchor="ctr"/>
+            <a:lstStyle/>
             <a:p>
               <a:pPr algn="ctr"/>
               <a:endParaRPr lang="en-US"/>
@@ -4139,6 +4360,7 @@
           </p:style>
           <p:txBody>
             <a:bodyPr rtlCol="0" anchor="ctr"/>
+            <a:lstStyle/>
             <a:p>
               <a:pPr algn="ctr"/>
               <a:endParaRPr lang="en-US"/>
@@ -4200,6 +4422,7 @@
           </p:style>
           <p:txBody>
             <a:bodyPr rtlCol="0" anchor="ctr"/>
+            <a:lstStyle/>
             <a:p>
               <a:pPr algn="ctr"/>
               <a:endParaRPr lang="en-US"/>
@@ -4243,6 +4466,7 @@
           </p:style>
           <p:txBody>
             <a:bodyPr rtlCol="0" anchor="ctr"/>
+            <a:lstStyle/>
             <a:p>
               <a:pPr algn="ctr"/>
               <a:endParaRPr lang="en-US"/>
@@ -4286,6 +4510,7 @@
           </p:style>
           <p:txBody>
             <a:bodyPr rtlCol="0" anchor="ctr"/>
+            <a:lstStyle/>
             <a:p>
               <a:pPr algn="ctr"/>
               <a:endParaRPr lang="en-US"/>
@@ -4313,6 +4538,7 @@
           <a:bodyPr wrap="none" rtlCol="0">
             <a:spAutoFit/>
           </a:bodyPr>
+          <a:lstStyle/>
           <a:p>
             <a:r>
               <a:rPr lang="en-US" dirty="0" smtClean="0">
@@ -4350,6 +4576,7 @@
           <a:bodyPr wrap="none" rtlCol="0">
             <a:spAutoFit/>
           </a:bodyPr>
+          <a:lstStyle/>
           <a:p>
             <a:r>
               <a:rPr lang="en-US" dirty="0" smtClean="0">
@@ -4367,19 +4594,6 @@
               </a:rPr>
               <a:t>Decoder</a:t>
             </a:r>
-            <a:endParaRPr lang="en-US" dirty="0" smtClean="0">
-              <a:gradFill>
-                <a:gsLst>
-                  <a:gs pos="0">
-                    <a:srgbClr val="9EE256"/>
-                  </a:gs>
-                  <a:gs pos="100000">
-                    <a:srgbClr val="52762D"/>
-                  </a:gs>
-                </a:gsLst>
-                <a:lin ang="5400000" scaled="0"/>
-              </a:gradFill>
-            </a:endParaRPr>
           </a:p>
         </p:txBody>
       </p:sp>
@@ -4483,6 +4697,7 @@
             <a:bodyPr wrap="none" rtlCol="0">
               <a:spAutoFit/>
             </a:bodyPr>
+            <a:lstStyle/>
             <a:p>
               <a:r>
                 <a:rPr lang="en-US" dirty="0" smtClean="0">
@@ -4587,6 +4802,7 @@
           </p:style>
           <p:txBody>
             <a:bodyPr rtlCol="0" anchor="ctr"/>
+            <a:lstStyle/>
             <a:p>
               <a:pPr algn="ctr"/>
               <a:endParaRPr lang="en-US"/>
@@ -4665,6 +4881,7 @@
           </p:style>
           <p:txBody>
             <a:bodyPr rtlCol="0" anchor="ctr"/>
+            <a:lstStyle/>
             <a:p>
               <a:pPr algn="ctr"/>
               <a:endParaRPr lang="en-US"/>
@@ -4743,6 +4960,7 @@
           </p:style>
           <p:txBody>
             <a:bodyPr rtlCol="0" anchor="ctr"/>
+            <a:lstStyle/>
             <a:p>
               <a:pPr algn="ctr"/>
               <a:endParaRPr lang="en-US"/>
@@ -4769,6 +4987,7 @@
             <a:bodyPr wrap="none" rtlCol="0">
               <a:spAutoFit/>
             </a:bodyPr>
+            <a:lstStyle/>
             <a:p>
               <a:pPr algn="ctr"/>
               <a:r>
@@ -4801,6 +5020,7 @@
         <p:spPr/>
         <p:txBody>
           <a:bodyPr/>
+          <a:lstStyle/>
           <a:p>
             <a:pPr marL="342900" indent="-342900">
               <a:buFont typeface="Arial" panose="020B0604020202020204" pitchFamily="34" charset="0"/>
@@ -4810,7 +5030,6 @@
               <a:rPr lang="en-US"/>
               <a:t>CNN</a:t>
             </a:r>
-            <a:endParaRPr lang="en-US"/>
           </a:p>
           <a:p>
             <a:pPr marL="342900" indent="-342900">
@@ -4823,9 +5042,6 @@
               </a:rPr>
               <a:t>ENCODER DECODER</a:t>
             </a:r>
-            <a:endParaRPr lang="en-US">
-              <a:sym typeface="+mn-ea"/>
-            </a:endParaRPr>
           </a:p>
         </p:txBody>
       </p:sp>
@@ -5130,7 +5346,6 @@
               <a:rPr lang="en-US"/>
               <a:t>loss function</a:t>
             </a:r>
-            <a:endParaRPr lang="en-US"/>
           </a:p>
         </p:txBody>
       </p:sp>
@@ -5138,14 +5353,14 @@
         <p:nvPicPr>
           <p:cNvPr id="4" name="Content Placeholder 3"/>
           <p:cNvPicPr>
-            <a:picLocks noChangeAspect="1"/>
+            <a:picLocks noGrp="1" noChangeAspect="1"/>
           </p:cNvPicPr>
           <p:nvPr>
             <p:ph idx="1"/>
           </p:nvPr>
         </p:nvPicPr>
         <p:blipFill>
-          <a:blip r:embed="rId1"/>
+          <a:blip r:embed="rId2"/>
           <a:stretch>
             <a:fillRect/>
           </a:stretch>
@@ -5291,6 +5506,7 @@
           <a:bodyPr lIns="91425" tIns="91425" rIns="91425" bIns="91425" anchor="t" anchorCtr="0">
             <a:noAutofit/>
           </a:bodyPr>
+          <a:lstStyle/>
           <a:p>
             <a:pPr lvl="0" algn="ctr" rtl="0">
               <a:spcBef>
@@ -5306,11 +5522,6 @@
               </a:rPr>
               <a:t>1. Appearance Matching Loss</a:t>
             </a:r>
-            <a:endParaRPr lang="en-US" altLang="en-GB" sz="2400" b="1">
-              <a:solidFill>
-                <a:srgbClr val="6AA84F"/>
-              </a:solidFill>
-            </a:endParaRPr>
           </a:p>
         </p:txBody>
       </p:sp>
@@ -5337,6 +5548,7 @@
           <a:bodyPr lIns="91425" tIns="91425" rIns="91425" bIns="91425" anchor="t" anchorCtr="0">
             <a:noAutofit/>
           </a:bodyPr>
+          <a:lstStyle/>
           <a:p>
             <a:pPr lvl="0" algn="ctr" rtl="0">
               <a:spcBef>
@@ -5352,11 +5564,6 @@
               </a:rPr>
               <a:t>2. Disparity Smoothness Loss</a:t>
             </a:r>
-            <a:endParaRPr lang="en-US" altLang="en-GB" sz="2400" b="1">
-              <a:solidFill>
-                <a:srgbClr val="6AA84F"/>
-              </a:solidFill>
-            </a:endParaRPr>
           </a:p>
         </p:txBody>
       </p:sp>
@@ -5383,6 +5590,7 @@
           <a:bodyPr lIns="91425" tIns="91425" rIns="91425" bIns="91425" anchor="t" anchorCtr="0">
             <a:noAutofit/>
           </a:bodyPr>
+          <a:lstStyle/>
           <a:p>
             <a:pPr lvl="0" algn="ctr" rtl="0">
               <a:spcBef>
@@ -5398,11 +5606,6 @@
               </a:rPr>
               <a:t>3. Left-Right Disparity Smoothness Loss</a:t>
             </a:r>
-            <a:endParaRPr lang="en-US" altLang="en-GB" sz="2400" b="1">
-              <a:solidFill>
-                <a:srgbClr val="6AA84F"/>
-              </a:solidFill>
-            </a:endParaRPr>
           </a:p>
         </p:txBody>
       </p:sp>
@@ -5665,16 +5868,23 @@
           <a:lstStyle/>
           <a:p>
             <a:r>
-              <a:rPr lang="en-US"/>
-              <a:t>m1_2 digging into self_ supervised monocular depth prediction</a:t>
-            </a:r>
-            <a:endParaRPr lang="en-US"/>
+              <a:rPr lang="en-US" dirty="0"/>
+              <a:t>m1_1</a:t>
+            </a:r>
+            <a:br>
+              <a:rPr lang="en-US" dirty="0"/>
+            </a:br>
+            <a:r>
+              <a:rPr lang="en-US" dirty="0" smtClean="0"/>
+              <a:t>known limitations</a:t>
+            </a:r>
+            <a:endParaRPr lang="en-US" dirty="0"/>
           </a:p>
         </p:txBody>
       </p:sp>
       <p:sp>
         <p:nvSpPr>
-          <p:cNvPr id="3" name="Content Placeholder 2"/>
+          <p:cNvPr id="3" name="Inhaltsplatzhalter 2"/>
           <p:cNvSpPr>
             <a:spLocks noGrp="1"/>
           </p:cNvSpPr>
@@ -5682,20 +5892,224 @@
             <p:ph idx="1"/>
           </p:nvPr>
         </p:nvSpPr>
-        <p:spPr/>
+        <p:spPr>
+          <a:xfrm>
+            <a:off x="360000" y="1620000"/>
+            <a:ext cx="8532480" cy="4479943"/>
+          </a:xfrm>
+        </p:spPr>
         <p:txBody>
           <a:bodyPr/>
           <a:lstStyle/>
           <a:p>
-            <a:endParaRPr lang="en-US"/>
+            <a:pPr marL="342900" indent="-342900">
+              <a:buFont typeface="Arial" panose="020B0604020202020204" pitchFamily="34" charset="0"/>
+              <a:buChar char="•"/>
+            </a:pPr>
+            <a:r>
+              <a:rPr lang="de-DE" dirty="0" err="1" smtClean="0"/>
+              <a:t>Since</a:t>
+            </a:r>
+            <a:r>
+              <a:rPr lang="de-DE" dirty="0" smtClean="0"/>
+              <a:t> </a:t>
+            </a:r>
+            <a:r>
+              <a:rPr lang="de-DE" dirty="0" err="1" smtClean="0"/>
+              <a:t>method</a:t>
+            </a:r>
+            <a:r>
+              <a:rPr lang="de-DE" dirty="0" smtClean="0"/>
+              <a:t> </a:t>
+            </a:r>
+            <a:r>
+              <a:rPr lang="de-DE" dirty="0" err="1" smtClean="0"/>
+              <a:t>relies</a:t>
+            </a:r>
+            <a:r>
+              <a:rPr lang="de-DE" dirty="0" smtClean="0"/>
+              <a:t> on </a:t>
+            </a:r>
+            <a:r>
+              <a:rPr lang="de-DE" dirty="0" err="1" smtClean="0"/>
+              <a:t>image</a:t>
+            </a:r>
+            <a:r>
+              <a:rPr lang="de-DE" dirty="0" smtClean="0"/>
+              <a:t> </a:t>
+            </a:r>
+            <a:r>
+              <a:rPr lang="de-DE" dirty="0" err="1" smtClean="0"/>
+              <a:t>reconstruction</a:t>
+            </a:r>
+            <a:r>
+              <a:rPr lang="de-DE" dirty="0" smtClean="0"/>
+              <a:t> </a:t>
+            </a:r>
+            <a:r>
+              <a:rPr lang="de-DE" dirty="0" err="1" smtClean="0"/>
+              <a:t>term</a:t>
+            </a:r>
+            <a:r>
+              <a:rPr lang="de-DE" dirty="0" smtClean="0"/>
+              <a:t>, </a:t>
+            </a:r>
+            <a:r>
+              <a:rPr lang="de-DE" dirty="0" err="1" smtClean="0"/>
+              <a:t>specular</a:t>
+            </a:r>
+            <a:r>
+              <a:rPr lang="de-DE" dirty="0" smtClean="0"/>
+              <a:t> </a:t>
+            </a:r>
+            <a:r>
+              <a:rPr lang="de-DE" dirty="0" err="1" smtClean="0"/>
+              <a:t>and</a:t>
+            </a:r>
+            <a:r>
+              <a:rPr lang="de-DE" dirty="0" smtClean="0"/>
+              <a:t> transparent </a:t>
+            </a:r>
+            <a:r>
+              <a:rPr lang="de-DE" dirty="0" err="1" smtClean="0"/>
+              <a:t>surfaces</a:t>
+            </a:r>
+            <a:r>
+              <a:rPr lang="de-DE" dirty="0" smtClean="0"/>
+              <a:t> </a:t>
+            </a:r>
+            <a:r>
+              <a:rPr lang="de-DE" dirty="0" err="1" smtClean="0"/>
+              <a:t>produce</a:t>
+            </a:r>
+            <a:r>
+              <a:rPr lang="de-DE" dirty="0" smtClean="0"/>
+              <a:t> </a:t>
+            </a:r>
+            <a:r>
+              <a:rPr lang="de-DE" dirty="0" err="1" smtClean="0"/>
+              <a:t>inconsistent</a:t>
+            </a:r>
+            <a:r>
+              <a:rPr lang="de-DE" dirty="0" smtClean="0"/>
+              <a:t> </a:t>
+            </a:r>
+            <a:r>
+              <a:rPr lang="de-DE" dirty="0" err="1" smtClean="0"/>
+              <a:t>depth</a:t>
+            </a:r>
+            <a:endParaRPr lang="de-DE" dirty="0" smtClean="0"/>
+          </a:p>
+          <a:p>
+            <a:pPr marL="342900" indent="-342900">
+              <a:buFont typeface="Arial" panose="020B0604020202020204" pitchFamily="34" charset="0"/>
+              <a:buChar char="•"/>
+            </a:pPr>
+            <a:r>
+              <a:rPr lang="de-DE" dirty="0" err="1" smtClean="0"/>
+              <a:t>Disparity</a:t>
+            </a:r>
+            <a:r>
+              <a:rPr lang="de-DE" dirty="0" smtClean="0"/>
+              <a:t> Error </a:t>
+            </a:r>
+            <a:r>
+              <a:rPr lang="de-DE" dirty="0" err="1" smtClean="0"/>
+              <a:t>maps</a:t>
+            </a:r>
+            <a:r>
+              <a:rPr lang="de-DE" dirty="0" smtClean="0"/>
+              <a:t> </a:t>
+            </a:r>
+            <a:r>
+              <a:rPr lang="de-DE" dirty="0" err="1" smtClean="0"/>
+              <a:t>show</a:t>
+            </a:r>
+            <a:r>
+              <a:rPr lang="de-DE" dirty="0" smtClean="0"/>
+              <a:t> </a:t>
+            </a:r>
+            <a:r>
+              <a:rPr lang="de-DE" dirty="0" err="1" smtClean="0"/>
+              <a:t>inconsistency</a:t>
+            </a:r>
+            <a:r>
+              <a:rPr lang="de-DE" dirty="0" smtClean="0"/>
+              <a:t> </a:t>
+            </a:r>
+            <a:r>
+              <a:rPr lang="de-DE" dirty="0" err="1" smtClean="0"/>
+              <a:t>for</a:t>
+            </a:r>
+            <a:r>
+              <a:rPr lang="de-DE" dirty="0" smtClean="0"/>
+              <a:t> </a:t>
+            </a:r>
+            <a:r>
+              <a:rPr lang="de-DE" dirty="0" err="1" smtClean="0"/>
+              <a:t>close-by-objects</a:t>
+            </a:r>
+            <a:r>
+              <a:rPr lang="de-DE" dirty="0" smtClean="0"/>
+              <a:t>, </a:t>
+            </a:r>
+            <a:r>
+              <a:rPr lang="de-DE" dirty="0" err="1" smtClean="0"/>
+              <a:t>texture-less</a:t>
+            </a:r>
+            <a:r>
+              <a:rPr lang="de-DE" dirty="0" smtClean="0"/>
+              <a:t> </a:t>
+            </a:r>
+            <a:r>
+              <a:rPr lang="de-DE" dirty="0" err="1" smtClean="0"/>
+              <a:t>regions</a:t>
+            </a:r>
+            <a:r>
+              <a:rPr lang="de-DE" dirty="0" smtClean="0"/>
+              <a:t> </a:t>
+            </a:r>
+            <a:r>
+              <a:rPr lang="de-DE" dirty="0" err="1" smtClean="0"/>
+              <a:t>and</a:t>
+            </a:r>
+            <a:r>
+              <a:rPr lang="de-DE" dirty="0" smtClean="0"/>
+              <a:t> </a:t>
+            </a:r>
+            <a:r>
+              <a:rPr lang="de-DE" dirty="0" err="1" smtClean="0"/>
+              <a:t>occlusion</a:t>
+            </a:r>
+            <a:r>
+              <a:rPr lang="de-DE" dirty="0" smtClean="0"/>
+              <a:t> </a:t>
+            </a:r>
+            <a:r>
+              <a:rPr lang="de-DE" dirty="0" err="1" smtClean="0"/>
+              <a:t>boundaries</a:t>
+            </a:r>
+            <a:endParaRPr lang="de-DE" dirty="0"/>
           </a:p>
         </p:txBody>
       </p:sp>
     </p:spTree>
+    <p:extLst>
+      <p:ext uri="{BB962C8B-B14F-4D97-AF65-F5344CB8AC3E}">
+        <p14:creationId xmlns:p14="http://schemas.microsoft.com/office/powerpoint/2010/main" val="1386826469"/>
+      </p:ext>
+    </p:extLst>
   </p:cSld>
   <p:clrMapOvr>
     <a:masterClrMapping/>
   </p:clrMapOvr>
+  <p:timing>
+    <p:tnLst>
+      <p:par>
+        <p:cTn id="1" dur="indefinite" restart="never" nodeType="tmRoot"/>
+      </p:par>
+    </p:tnLst>
+  </p:timing>
 </p:sld>
 </file>
 
@@ -5733,9 +6147,74 @@
           <a:p>
             <a:r>
               <a:rPr lang="en-US"/>
+              <a:t>m1_2 digging into self_ supervised monocular depth prediction</a:t>
+            </a:r>
+          </a:p>
+        </p:txBody>
+      </p:sp>
+      <p:sp>
+        <p:nvSpPr>
+          <p:cNvPr id="3" name="Content Placeholder 2"/>
+          <p:cNvSpPr>
+            <a:spLocks noGrp="1"/>
+          </p:cNvSpPr>
+          <p:nvPr>
+            <p:ph idx="1"/>
+          </p:nvPr>
+        </p:nvSpPr>
+        <p:spPr/>
+        <p:txBody>
+          <a:bodyPr/>
+          <a:lstStyle/>
+          <a:p>
+            <a:endParaRPr lang="en-US"/>
+          </a:p>
+        </p:txBody>
+      </p:sp>
+    </p:spTree>
+  </p:cSld>
+  <p:clrMapOvr>
+    <a:masterClrMapping/>
+  </p:clrMapOvr>
+</p:sld>
+</file>
+
+<file path=ppt/slides/slide15.xml><?xml version="1.0" encoding="utf-8"?>
+<p:sld xmlns:a="http://schemas.openxmlformats.org/drawingml/2006/main" xmlns:r="http://schemas.openxmlformats.org/officeDocument/2006/relationships" xmlns:p="http://schemas.openxmlformats.org/presentationml/2006/main">
+  <p:cSld>
+    <p:spTree>
+      <p:nvGrpSpPr>
+        <p:cNvPr id="1" name=""/>
+        <p:cNvGrpSpPr/>
+        <p:nvPr/>
+      </p:nvGrpSpPr>
+      <p:grpSpPr>
+        <a:xfrm>
+          <a:off x="0" y="0"/>
+          <a:ext cx="0" cy="0"/>
+          <a:chOff x="0" y="0"/>
+          <a:chExt cx="0" cy="0"/>
+        </a:xfrm>
+      </p:grpSpPr>
+      <p:sp>
+        <p:nvSpPr>
+          <p:cNvPr id="2" name="Title 1"/>
+          <p:cNvSpPr>
+            <a:spLocks noGrp="1"/>
+          </p:cNvSpPr>
+          <p:nvPr>
+            <p:ph type="title"/>
+          </p:nvPr>
+        </p:nvSpPr>
+        <p:spPr/>
+        <p:txBody>
+          <a:bodyPr/>
+          <a:lstStyle/>
+          <a:p>
+            <a:r>
+              <a:rPr lang="en-US"/>
               <a:t>m2_1 Unsupervised Learning of Depth and Ego-Motion from Video</a:t>
             </a:r>
-            <a:endParaRPr lang="en-US"/>
           </a:p>
         </p:txBody>
       </p:sp>
@@ -5802,7 +6281,6 @@
               <a:rPr lang="en-US"/>
               <a:t>Superpixel Benchmarks</a:t>
             </a:r>
-            <a:endParaRPr lang="en-US"/>
           </a:p>
         </p:txBody>
       </p:sp>
@@ -5859,7 +6337,7 @@
           <p:nvPr/>
         </p:nvPicPr>
         <p:blipFill>
-          <a:blip r:embed="rId1">
+          <a:blip r:embed="rId2">
             <a:extLst>
               <a:ext uri="{28A0092B-C50C-407E-A947-70E740481C1C}">
                 <a14:useLocalDpi xmlns:a14="http://schemas.microsoft.com/office/drawing/2010/main" val="0"/>
@@ -5899,20 +6377,15 @@
               <a:rPr lang="en-US" dirty="0"/>
               <a:t>s1 SLIC- Simple linear iterative clustering </a:t>
             </a:r>
-            <a:endParaRPr lang="en-US" dirty="0"/>
           </a:p>
         </p:txBody>
       </p:sp>
-      <mc:AlternateContent xmlns:mc="http://schemas.openxmlformats.org/markup-compatibility/2006">
-        <mc:Choice xmlns:a14="http://schemas.microsoft.com/office/drawing/2010/main" Requires="a14">
+      <mc:AlternateContent xmlns:mc="http://schemas.openxmlformats.org/markup-compatibility/2006" xmlns:a14="http://schemas.microsoft.com/office/drawing/2010/main">
+        <mc:Choice Requires="a14">
           <p:sp>
             <p:nvSpPr>
               <p:cNvPr id="4" name="Textfeld 3">
-                <a:extLst>
-                  <a:ext uri="{FF2B5EF4-FFF2-40B4-BE49-F238E27FC236}">
-                    <ele attr="{F3CCCEE2-048B-E042-9215-1DCDC72685DB}"/>
-                  </a:ext>
-                </a:extLst>
+                <a:extLst/>
               </p:cNvPr>
               <p:cNvSpPr txBox="1"/>
               <p:nvPr/>
@@ -6185,7 +6658,7 @@
             </p:txBody>
           </p:sp>
         </mc:Choice>
-        <mc:Fallback>
+        <mc:Fallback xmlns="">
           <p:sp>
             <p:nvSpPr>
               <p:cNvPr id="4" name="Textfeld 3"/>
@@ -6203,7 +6676,7 @@
                 <a:avLst/>
               </a:prstGeom>
               <a:blipFill rotWithShape="1">
-                <a:blip r:embed="rId2"/>
+                <a:blip r:embed="rId3"/>
                 <a:stretch>
                   <a:fillRect l="-777" t="-1042" b="-5208"/>
                 </a:stretch>
@@ -6236,7 +6709,7 @@
           <p:nvPr/>
         </p:nvPicPr>
         <p:blipFill>
-          <a:blip r:embed="rId3">
+          <a:blip r:embed="rId4">
             <a:extLst>
               <a:ext uri="{28A0092B-C50C-407E-A947-70E740481C1C}">
                 <a14:useLocalDpi xmlns:a14="http://schemas.microsoft.com/office/drawing/2010/main" val="0"/>
@@ -6283,21 +6756,18 @@
               <a:rPr lang="de-DE" sz="700" dirty="0"/>
               <a:t>https://www.researchgate.net/figure/</a:t>
             </a:r>
-            <a:endParaRPr lang="de-DE" sz="700" dirty="0"/>
           </a:p>
           <a:p>
             <a:r>
               <a:rPr lang="de-DE" sz="700" dirty="0"/>
               <a:t>A-digital-image-is-a-2D-array-of-pixels</a:t>
             </a:r>
-            <a:endParaRPr lang="de-DE" sz="700" dirty="0"/>
           </a:p>
           <a:p>
             <a:r>
               <a:rPr lang="de-DE" sz="700" dirty="0"/>
               <a:t>-Each-pixel-is-characterised-by-its-x-y_fig1_221918148</a:t>
             </a:r>
-            <a:endParaRPr lang="de-DE" sz="700" dirty="0"/>
           </a:p>
         </p:txBody>
       </p:sp>
@@ -6343,7 +6813,6 @@
               <a:rPr lang="de-DE" sz="700" dirty="0"/>
               <a:t>/04/1/4/8/7/2/5/1/Lab-Farbraum-ead9d79b2a394144.jpeg</a:t>
             </a:r>
-            <a:endParaRPr lang="de-DE" sz="700" dirty="0"/>
           </a:p>
         </p:txBody>
       </p:sp>
@@ -6467,16 +6936,12 @@
           </a:p>
         </p:txBody>
       </p:sp>
-      <mc:AlternateContent xmlns:mc="http://schemas.openxmlformats.org/markup-compatibility/2006">
-        <mc:Choice xmlns:a14="http://schemas.microsoft.com/office/drawing/2010/main" Requires="a14">
+      <mc:AlternateContent xmlns:mc="http://schemas.openxmlformats.org/markup-compatibility/2006" xmlns:a14="http://schemas.microsoft.com/office/drawing/2010/main">
+        <mc:Choice Requires="a14">
           <p:sp>
             <p:nvSpPr>
               <p:cNvPr id="20" name="Textfeld 19">
-                <a:extLst>
-                  <a:ext uri="{FF2B5EF4-FFF2-40B4-BE49-F238E27FC236}">
-                    <ele attr="{CB0E7A2F-66B9-6748-92E2-D438C51DA3C2}"/>
-                  </a:ext>
-                </a:extLst>
+                <a:extLst/>
               </p:cNvPr>
               <p:cNvSpPr txBox="1"/>
               <p:nvPr/>
@@ -6520,7 +6985,7 @@
             </p:txBody>
           </p:sp>
         </mc:Choice>
-        <mc:Fallback>
+        <mc:Fallback xmlns="">
           <p:sp>
             <p:nvSpPr>
               <p:cNvPr id="20" name="Textfeld 19"/>
@@ -6538,7 +7003,7 @@
                 <a:avLst/>
               </a:prstGeom>
               <a:blipFill rotWithShape="1">
-                <a:blip r:embed="rId4"/>
+                <a:blip r:embed="rId5"/>
                 <a:stretch>
                   <a:fillRect l="-2985" t="-6667" r="-2239" b="-26667"/>
                 </a:stretch>
@@ -6606,20 +7071,15 @@
               <a:rPr lang="en-US" dirty="0"/>
               <a:t>s1 SLIC- Simple linear iterative clustering </a:t>
             </a:r>
-            <a:endParaRPr lang="en-US" dirty="0"/>
           </a:p>
         </p:txBody>
       </p:sp>
-      <mc:AlternateContent xmlns:mc="http://schemas.openxmlformats.org/markup-compatibility/2006">
-        <mc:Choice xmlns:a14="http://schemas.microsoft.com/office/drawing/2010/main" Requires="a14">
+      <mc:AlternateContent xmlns:mc="http://schemas.openxmlformats.org/markup-compatibility/2006" xmlns:a14="http://schemas.microsoft.com/office/drawing/2010/main">
+        <mc:Choice Requires="a14">
           <p:sp>
             <p:nvSpPr>
               <p:cNvPr id="40" name="Textfeld 39">
-                <a:extLst>
-                  <a:ext uri="{FF2B5EF4-FFF2-40B4-BE49-F238E27FC236}">
-                    <ele attr="{303CCC09-5DF5-1145-A743-72B7C2D7A9E3}"/>
-                  </a:ext>
-                </a:extLst>
+                <a:extLst/>
               </p:cNvPr>
               <p:cNvSpPr txBox="1"/>
               <p:nvPr/>
@@ -6811,7 +7271,7 @@
             </p:txBody>
           </p:sp>
         </mc:Choice>
-        <mc:Fallback>
+        <mc:Fallback xmlns="">
           <p:sp>
             <p:nvSpPr>
               <p:cNvPr id="40" name="Textfeld 39"/>
@@ -6829,7 +7289,7 @@
                 <a:avLst/>
               </a:prstGeom>
               <a:blipFill rotWithShape="1">
-                <a:blip r:embed="rId1"/>
+                <a:blip r:embed="rId2"/>
                 <a:stretch>
                   <a:fillRect l="-737" t="-2703" b="-8108"/>
                 </a:stretch>
@@ -6853,16 +7313,12 @@
           </p:sp>
         </mc:Fallback>
       </mc:AlternateContent>
-      <mc:AlternateContent xmlns:mc="http://schemas.openxmlformats.org/markup-compatibility/2006">
-        <mc:Choice xmlns:a14="http://schemas.microsoft.com/office/drawing/2010/main" Requires="a14">
+      <mc:AlternateContent xmlns:mc="http://schemas.openxmlformats.org/markup-compatibility/2006" xmlns:a14="http://schemas.microsoft.com/office/drawing/2010/main">
+        <mc:Choice Requires="a14">
           <p:sp>
             <p:nvSpPr>
               <p:cNvPr id="41" name="Textfeld 40">
-                <a:extLst>
-                  <a:ext uri="{FF2B5EF4-FFF2-40B4-BE49-F238E27FC236}">
-                    <ele attr="{43DB4424-8DFF-2B46-8D73-DF4A7587E7F8}"/>
-                  </a:ext>
-                </a:extLst>
+                <a:extLst/>
               </p:cNvPr>
               <p:cNvSpPr txBox="1"/>
               <p:nvPr/>
@@ -7151,7 +7607,7 @@
             </p:txBody>
           </p:sp>
         </mc:Choice>
-        <mc:Fallback>
+        <mc:Fallback xmlns="">
           <p:sp>
             <p:nvSpPr>
               <p:cNvPr id="41" name="Textfeld 40"/>
@@ -7169,7 +7625,7 @@
                 <a:avLst/>
               </a:prstGeom>
               <a:blipFill rotWithShape="1">
-                <a:blip r:embed="rId2"/>
+                <a:blip r:embed="rId3"/>
                 <a:stretch>
                   <a:fillRect b="-16667"/>
                 </a:stretch>
@@ -7193,16 +7649,12 @@
           </p:sp>
         </mc:Fallback>
       </mc:AlternateContent>
-      <mc:AlternateContent xmlns:mc="http://schemas.openxmlformats.org/markup-compatibility/2006">
-        <mc:Choice xmlns:a14="http://schemas.microsoft.com/office/drawing/2010/main" Requires="a14">
+      <mc:AlternateContent xmlns:mc="http://schemas.openxmlformats.org/markup-compatibility/2006" xmlns:a14="http://schemas.microsoft.com/office/drawing/2010/main">
+        <mc:Choice Requires="a14">
           <p:sp>
             <p:nvSpPr>
               <p:cNvPr id="42" name="Textfeld 41">
-                <a:extLst>
-                  <a:ext uri="{FF2B5EF4-FFF2-40B4-BE49-F238E27FC236}">
-                    <ele attr="{C946DD8E-5C0C-2E4F-B812-CA0F32FF2FEF}"/>
-                  </a:ext>
-                </a:extLst>
+                <a:extLst/>
               </p:cNvPr>
               <p:cNvSpPr txBox="1"/>
               <p:nvPr/>
@@ -7333,7 +7785,7 @@
             </p:txBody>
           </p:sp>
         </mc:Choice>
-        <mc:Fallback>
+        <mc:Fallback xmlns="">
           <p:sp>
             <p:nvSpPr>
               <p:cNvPr id="42" name="Textfeld 41"/>
@@ -7351,7 +7803,7 @@
                 <a:avLst/>
               </a:prstGeom>
               <a:blipFill rotWithShape="1">
-                <a:blip r:embed="rId3"/>
+                <a:blip r:embed="rId4"/>
                 <a:stretch>
                   <a:fillRect/>
                 </a:stretch>
@@ -7375,16 +7827,12 @@
           </p:sp>
         </mc:Fallback>
       </mc:AlternateContent>
-      <mc:AlternateContent xmlns:mc="http://schemas.openxmlformats.org/markup-compatibility/2006">
-        <mc:Choice xmlns:a14="http://schemas.microsoft.com/office/drawing/2010/main" Requires="a14">
+      <mc:AlternateContent xmlns:mc="http://schemas.openxmlformats.org/markup-compatibility/2006" xmlns:a14="http://schemas.microsoft.com/office/drawing/2010/main">
+        <mc:Choice Requires="a14">
           <p:sp>
             <p:nvSpPr>
               <p:cNvPr id="43" name="Textfeld 42">
-                <a:extLst>
-                  <a:ext uri="{FF2B5EF4-FFF2-40B4-BE49-F238E27FC236}">
-                    <ele attr="{D665998A-26CF-BE4A-B97A-FAE8D91C0DD3}"/>
-                  </a:ext>
-                </a:extLst>
+                <a:extLst/>
               </p:cNvPr>
               <p:cNvSpPr txBox="1"/>
               <p:nvPr/>
@@ -7528,7 +7976,7 @@
             </p:txBody>
           </p:sp>
         </mc:Choice>
-        <mc:Fallback>
+        <mc:Fallback xmlns="">
           <p:sp>
             <p:nvSpPr>
               <p:cNvPr id="43" name="Textfeld 42"/>
@@ -7546,7 +7994,7 @@
                 <a:avLst/>
               </a:prstGeom>
               <a:blipFill rotWithShape="1">
-                <a:blip r:embed="rId4"/>
+                <a:blip r:embed="rId5"/>
                 <a:stretch>
                   <a:fillRect l="-741" t="-1923" b="-13462"/>
                 </a:stretch>
@@ -7570,16 +8018,12 @@
           </p:sp>
         </mc:Fallback>
       </mc:AlternateContent>
-      <mc:AlternateContent xmlns:mc="http://schemas.openxmlformats.org/markup-compatibility/2006">
-        <mc:Choice xmlns:a14="http://schemas.microsoft.com/office/drawing/2010/main" Requires="a14">
+      <mc:AlternateContent xmlns:mc="http://schemas.openxmlformats.org/markup-compatibility/2006" xmlns:a14="http://schemas.microsoft.com/office/drawing/2010/main">
+        <mc:Choice Requires="a14">
           <p:sp>
             <p:nvSpPr>
               <p:cNvPr id="44" name="Textfeld 43">
-                <a:extLst>
-                  <a:ext uri="{FF2B5EF4-FFF2-40B4-BE49-F238E27FC236}">
-                    <ele attr="{2CF8AA26-7B8F-CE4D-BECA-AB1716888B81}"/>
-                  </a:ext>
-                </a:extLst>
+                <a:extLst/>
               </p:cNvPr>
               <p:cNvSpPr txBox="1"/>
               <p:nvPr/>
@@ -7890,7 +8334,7 @@
             </p:txBody>
           </p:sp>
         </mc:Choice>
-        <mc:Fallback>
+        <mc:Fallback xmlns="">
           <p:sp>
             <p:nvSpPr>
               <p:cNvPr id="44" name="Textfeld 43"/>
@@ -7908,7 +8352,7 @@
                 <a:avLst/>
               </a:prstGeom>
               <a:blipFill rotWithShape="1">
-                <a:blip r:embed="rId5"/>
+                <a:blip r:embed="rId6"/>
                 <a:stretch>
                   <a:fillRect b="-20000"/>
                 </a:stretch>
@@ -7941,7 +8385,7 @@
           <p:nvPr/>
         </p:nvPicPr>
         <p:blipFill>
-          <a:blip r:embed="rId6">
+          <a:blip r:embed="rId7">
             <a:extLst>
               <a:ext uri="{28A0092B-C50C-407E-A947-70E740481C1C}">
                 <a14:useLocalDpi xmlns:a14="http://schemas.microsoft.com/office/drawing/2010/main" val="0"/>
@@ -7962,16 +8406,12 @@
           </a:prstGeom>
         </p:spPr>
       </p:pic>
-      <mc:AlternateContent xmlns:mc="http://schemas.openxmlformats.org/markup-compatibility/2006">
-        <mc:Choice xmlns:a14="http://schemas.microsoft.com/office/drawing/2010/main" Requires="a14">
+      <mc:AlternateContent xmlns:mc="http://schemas.openxmlformats.org/markup-compatibility/2006" xmlns:a14="http://schemas.microsoft.com/office/drawing/2010/main">
+        <mc:Choice Requires="a14">
           <p:sp>
             <p:nvSpPr>
               <p:cNvPr id="47" name="Textfeld 46">
-                <a:extLst>
-                  <a:ext uri="{FF2B5EF4-FFF2-40B4-BE49-F238E27FC236}">
-                    <ele attr="{F3DC2504-B7CE-7D42-BD98-B7089C97B485}"/>
-                  </a:ext>
-                </a:extLst>
+                <a:extLst/>
               </p:cNvPr>
               <p:cNvSpPr txBox="1"/>
               <p:nvPr/>
@@ -8045,7 +8485,7 @@
             </p:txBody>
           </p:sp>
         </mc:Choice>
-        <mc:Fallback>
+        <mc:Fallback xmlns="">
           <p:sp>
             <p:nvSpPr>
               <p:cNvPr id="47" name="Textfeld 46"/>
@@ -8063,7 +8503,7 @@
                 <a:avLst/>
               </a:prstGeom>
               <a:blipFill rotWithShape="1">
-                <a:blip r:embed="rId7"/>
+                <a:blip r:embed="rId8"/>
                 <a:stretch>
                   <a:fillRect/>
                 </a:stretch>
@@ -8190,24 +8630,15 @@
               </a:rPr>
               <a:t>S</a:t>
             </a:r>
-            <a:endParaRPr lang="de-DE" sz="2000" dirty="0">
-              <a:solidFill>
-                <a:srgbClr val="C00000"/>
-              </a:solidFill>
-            </a:endParaRPr>
           </a:p>
         </p:txBody>
       </p:sp>
-      <mc:AlternateContent xmlns:mc="http://schemas.openxmlformats.org/markup-compatibility/2006">
-        <mc:Choice xmlns:a14="http://schemas.microsoft.com/office/drawing/2010/main" Requires="a14">
+      <mc:AlternateContent xmlns:mc="http://schemas.openxmlformats.org/markup-compatibility/2006" xmlns:a14="http://schemas.microsoft.com/office/drawing/2010/main">
+        <mc:Choice Requires="a14">
           <p:sp>
             <p:nvSpPr>
               <p:cNvPr id="54" name="Textfeld 53">
-                <a:extLst>
-                  <a:ext uri="{FF2B5EF4-FFF2-40B4-BE49-F238E27FC236}">
-                    <ele attr="{F2A3C39C-724E-2646-8E6B-01168C6792B4}"/>
-                  </a:ext>
-                </a:extLst>
+                <a:extLst/>
               </p:cNvPr>
               <p:cNvSpPr txBox="1"/>
               <p:nvPr/>
@@ -8281,7 +8712,7 @@
             </p:txBody>
           </p:sp>
         </mc:Choice>
-        <mc:Fallback>
+        <mc:Fallback xmlns="">
           <p:sp>
             <p:nvSpPr>
               <p:cNvPr id="54" name="Textfeld 53"/>
@@ -8299,7 +8730,7 @@
                 <a:avLst/>
               </a:prstGeom>
               <a:blipFill rotWithShape="1">
-                <a:blip r:embed="rId8"/>
+                <a:blip r:embed="rId9"/>
                 <a:stretch>
                   <a:fillRect/>
                 </a:stretch>
@@ -8349,7 +8780,6 @@
               <a:rPr lang="de-DE" dirty="0"/>
               <a:t>N = 256x256p</a:t>
             </a:r>
-            <a:endParaRPr lang="de-DE" dirty="0"/>
           </a:p>
         </p:txBody>
       </p:sp>
@@ -8397,20 +8827,15 @@
               <a:rPr lang="en-US" dirty="0"/>
               <a:t>s1 SLIC- Simple linear iterative clustering </a:t>
             </a:r>
-            <a:endParaRPr lang="en-US" dirty="0"/>
           </a:p>
         </p:txBody>
       </p:sp>
-      <mc:AlternateContent xmlns:mc="http://schemas.openxmlformats.org/markup-compatibility/2006">
-        <mc:Choice xmlns:a14="http://schemas.microsoft.com/office/drawing/2010/main" Requires="a14">
+      <mc:AlternateContent xmlns:mc="http://schemas.openxmlformats.org/markup-compatibility/2006" xmlns:a14="http://schemas.microsoft.com/office/drawing/2010/main">
+        <mc:Choice Requires="a14">
           <p:sp>
             <p:nvSpPr>
               <p:cNvPr id="31" name="Textfeld 30">
-                <a:extLst>
-                  <a:ext uri="{FF2B5EF4-FFF2-40B4-BE49-F238E27FC236}">
-                    <ele attr="{331DEF4C-3750-864C-A846-8AD1C58FE497}"/>
-                  </a:ext>
-                </a:extLst>
+                <a:extLst/>
               </p:cNvPr>
               <p:cNvSpPr txBox="1"/>
               <p:nvPr/>
@@ -8525,7 +8950,7 @@
             </p:txBody>
           </p:sp>
         </mc:Choice>
-        <mc:Fallback>
+        <mc:Fallback xmlns="">
           <p:sp>
             <p:nvSpPr>
               <p:cNvPr id="31" name="Textfeld 30"/>
@@ -8543,7 +8968,7 @@
                 <a:avLst/>
               </a:prstGeom>
               <a:blipFill rotWithShape="1">
-                <a:blip r:embed="rId1"/>
+                <a:blip r:embed="rId2"/>
                 <a:stretch>
                   <a:fillRect l="-767" t="-6897" b="-24138"/>
                 </a:stretch>
@@ -8605,20 +9030,15 @@
               <a:rPr lang="de-DE" dirty="0"/>
               <a:t>: 2S x 2S </a:t>
             </a:r>
-            <a:endParaRPr lang="de-DE" dirty="0"/>
           </a:p>
         </p:txBody>
       </p:sp>
-      <mc:AlternateContent xmlns:mc="http://schemas.openxmlformats.org/markup-compatibility/2006">
-        <mc:Choice xmlns:a14="http://schemas.microsoft.com/office/drawing/2010/main" Requires="a14">
+      <mc:AlternateContent xmlns:mc="http://schemas.openxmlformats.org/markup-compatibility/2006" xmlns:a14="http://schemas.microsoft.com/office/drawing/2010/main">
+        <mc:Choice Requires="a14">
           <p:sp>
             <p:nvSpPr>
               <p:cNvPr id="33" name="Textfeld 32">
-                <a:extLst>
-                  <a:ext uri="{FF2B5EF4-FFF2-40B4-BE49-F238E27FC236}">
-                    <ele attr="{ABEC815D-D439-D448-8E67-D508AE06D99A}"/>
-                  </a:ext>
-                </a:extLst>
+                <a:extLst/>
               </p:cNvPr>
               <p:cNvSpPr txBox="1"/>
               <p:nvPr/>
@@ -8971,7 +9391,7 @@
             </p:txBody>
           </p:sp>
         </mc:Choice>
-        <mc:Fallback>
+        <mc:Fallback xmlns="">
           <p:sp>
             <p:nvSpPr>
               <p:cNvPr id="33" name="Textfeld 32"/>
@@ -8989,7 +9409,7 @@
                 <a:avLst/>
               </a:prstGeom>
               <a:blipFill rotWithShape="1">
-                <a:blip r:embed="rId2"/>
+                <a:blip r:embed="rId3"/>
                 <a:stretch>
                   <a:fillRect/>
                 </a:stretch>
@@ -9013,16 +9433,12 @@
           </p:sp>
         </mc:Fallback>
       </mc:AlternateContent>
-      <mc:AlternateContent xmlns:mc="http://schemas.openxmlformats.org/markup-compatibility/2006">
-        <mc:Choice xmlns:a14="http://schemas.microsoft.com/office/drawing/2010/main" Requires="a14">
+      <mc:AlternateContent xmlns:mc="http://schemas.openxmlformats.org/markup-compatibility/2006" xmlns:a14="http://schemas.microsoft.com/office/drawing/2010/main">
+        <mc:Choice Requires="a14">
           <p:sp>
             <p:nvSpPr>
               <p:cNvPr id="34" name="Textfeld 33">
-                <a:extLst>
-                  <a:ext uri="{FF2B5EF4-FFF2-40B4-BE49-F238E27FC236}">
-                    <ele attr="{73E615D9-1387-D04F-9651-42A6F49D39FE}"/>
-                  </a:ext>
-                </a:extLst>
+                <a:extLst/>
               </p:cNvPr>
               <p:cNvSpPr txBox="1"/>
               <p:nvPr/>
@@ -9283,7 +9699,7 @@
             </p:txBody>
           </p:sp>
         </mc:Choice>
-        <mc:Fallback>
+        <mc:Fallback xmlns="">
           <p:sp>
             <p:nvSpPr>
               <p:cNvPr id="34" name="Textfeld 33"/>
@@ -9301,7 +9717,7 @@
                 <a:avLst/>
               </a:prstGeom>
               <a:blipFill rotWithShape="1">
-                <a:blip r:embed="rId3"/>
+                <a:blip r:embed="rId4"/>
                 <a:stretch>
                   <a:fillRect/>
                 </a:stretch>
@@ -9325,16 +9741,12 @@
           </p:sp>
         </mc:Fallback>
       </mc:AlternateContent>
-      <mc:AlternateContent xmlns:mc="http://schemas.openxmlformats.org/markup-compatibility/2006">
-        <mc:Choice xmlns:a14="http://schemas.microsoft.com/office/drawing/2010/main" Requires="a14">
+      <mc:AlternateContent xmlns:mc="http://schemas.openxmlformats.org/markup-compatibility/2006" xmlns:a14="http://schemas.microsoft.com/office/drawing/2010/main">
+        <mc:Choice Requires="a14">
           <p:sp>
             <p:nvSpPr>
               <p:cNvPr id="35" name="Textfeld 34">
-                <a:extLst>
-                  <a:ext uri="{FF2B5EF4-FFF2-40B4-BE49-F238E27FC236}">
-                    <ele attr="{62DCFC56-F633-9947-B750-5FA44F840C3A}"/>
-                  </a:ext>
-                </a:extLst>
+                <a:extLst/>
               </p:cNvPr>
               <p:cNvSpPr txBox="1"/>
               <p:nvPr/>
@@ -9542,7 +9954,7 @@
             </p:txBody>
           </p:sp>
         </mc:Choice>
-        <mc:Fallback>
+        <mc:Fallback xmlns="">
           <p:sp>
             <p:nvSpPr>
               <p:cNvPr id="35" name="Textfeld 34"/>
@@ -9560,7 +9972,7 @@
                 <a:avLst/>
               </a:prstGeom>
               <a:blipFill rotWithShape="1">
-                <a:blip r:embed="rId4"/>
+                <a:blip r:embed="rId5"/>
                 <a:stretch>
                   <a:fillRect r="-723"/>
                 </a:stretch>
@@ -9584,16 +9996,12 @@
           </p:sp>
         </mc:Fallback>
       </mc:AlternateContent>
-      <mc:AlternateContent xmlns:mc="http://schemas.openxmlformats.org/markup-compatibility/2006">
-        <mc:Choice xmlns:a14="http://schemas.microsoft.com/office/drawing/2010/main" Requires="a14">
+      <mc:AlternateContent xmlns:mc="http://schemas.openxmlformats.org/markup-compatibility/2006" xmlns:a14="http://schemas.microsoft.com/office/drawing/2010/main">
+        <mc:Choice Requires="a14">
           <p:sp>
             <p:nvSpPr>
               <p:cNvPr id="36" name="Rechteck 35">
-                <a:extLst>
-                  <a:ext uri="{FF2B5EF4-FFF2-40B4-BE49-F238E27FC236}">
-                    <ele attr="{2ABF42A2-7C0E-0041-8AF9-F1D3F8298B98}"/>
-                  </a:ext>
-                </a:extLst>
+                <a:extLst/>
               </p:cNvPr>
               <p:cNvSpPr/>
               <p:nvPr/>
@@ -9765,7 +10173,7 @@
             </p:txBody>
           </p:sp>
         </mc:Choice>
-        <mc:Fallback>
+        <mc:Fallback xmlns="">
           <p:sp>
             <p:nvSpPr>
               <p:cNvPr id="36" name="Rechteck 35"/>
@@ -9783,7 +10191,7 @@
                 <a:avLst/>
               </a:prstGeom>
               <a:blipFill rotWithShape="1">
-                <a:blip r:embed="rId5"/>
+                <a:blip r:embed="rId6"/>
                 <a:stretch>
                   <a:fillRect l="-534" t="-3333" b="-23333"/>
                 </a:stretch>
@@ -9880,7 +10288,6 @@
               <a:rPr lang="de-DE" dirty="0"/>
               <a:t>.</a:t>
             </a:r>
-            <a:endParaRPr lang="de-DE" dirty="0"/>
           </a:p>
         </p:txBody>
       </p:sp>
@@ -9893,7 +10300,7 @@
           <p:nvPr/>
         </p:nvPicPr>
         <p:blipFill>
-          <a:blip r:embed="rId6">
+          <a:blip r:embed="rId7">
             <a:extLst>
               <a:ext uri="{28A0092B-C50C-407E-A947-70E740481C1C}">
                 <a14:useLocalDpi xmlns:a14="http://schemas.microsoft.com/office/drawing/2010/main" val="0"/>
@@ -9923,7 +10330,7 @@
           <p:nvPr/>
         </p:nvPicPr>
         <p:blipFill>
-          <a:blip r:embed="rId6">
+          <a:blip r:embed="rId7">
             <a:extLst>
               <a:ext uri="{28A0092B-C50C-407E-A947-70E740481C1C}">
                 <a14:useLocalDpi xmlns:a14="http://schemas.microsoft.com/office/drawing/2010/main" val="0"/>
@@ -9953,7 +10360,7 @@
           <p:nvPr/>
         </p:nvPicPr>
         <p:blipFill>
-          <a:blip r:embed="rId7">
+          <a:blip r:embed="rId8">
             <a:extLst>
               <a:ext uri="{28A0092B-C50C-407E-A947-70E740481C1C}">
                 <a14:useLocalDpi xmlns:a14="http://schemas.microsoft.com/office/drawing/2010/main" val="0"/>
@@ -10016,7 +10423,6 @@
               <a:rPr lang="de-DE" sz="800" dirty="0"/>
               <a:t>/A-cartoon-showing-the-progress-of-the-SLIC-algorithm-for-a-simple-case-The-top-left_fig3_322652376</a:t>
             </a:r>
-            <a:endParaRPr lang="de-DE" sz="800" dirty="0"/>
           </a:p>
         </p:txBody>
       </p:sp>
@@ -10069,7 +10475,6 @@
               <a:rPr lang="en-US"/>
               <a:t>s2 Learning Superpixels With segmentation aware infinity loss </a:t>
             </a:r>
-            <a:endParaRPr lang="en-US"/>
           </a:p>
         </p:txBody>
       </p:sp>
@@ -10117,7 +10522,6 @@
               <a:rPr lang="en-US"/>
               <a:t>s3 real time coarse to fine topologically preserving segmentation</a:t>
             </a:r>
-            <a:endParaRPr lang="en-US"/>
           </a:p>
         </p:txBody>
       </p:sp>
@@ -10184,7 +10588,6 @@
               <a:rPr lang="en-US"/>
               <a:t>m1_1 unsupervised monocular depth estimation with left right consistency</a:t>
             </a:r>
-            <a:endParaRPr lang="en-US"/>
           </a:p>
         </p:txBody>
       </p:sp>
@@ -10195,7 +10598,7 @@
           <p:nvPr/>
         </p:nvPicPr>
         <p:blipFill rotWithShape="1">
-          <a:blip r:embed="rId1"/>
+          <a:blip r:embed="rId2"/>
           <a:srcRect l="25612" r="28386"/>
           <a:stretch>
             <a:fillRect/>
@@ -10244,6 +10647,7 @@
           <a:bodyPr lIns="91425" tIns="91425" rIns="91425" bIns="91425" anchor="ctr" anchorCtr="0">
             <a:noAutofit/>
           </a:bodyPr>
+          <a:lstStyle/>
           <a:p>
             <a:pPr lvl="0">
               <a:spcBef>
@@ -10251,6 +10655,7 @@
               </a:spcBef>
               <a:buNone/>
             </a:pPr>
+            <a:endParaRPr/>
           </a:p>
         </p:txBody>
       </p:sp>
@@ -10261,7 +10666,7 @@
           <p:nvPr/>
         </p:nvPicPr>
         <p:blipFill rotWithShape="1">
-          <a:blip r:embed="rId2"/>
+          <a:blip r:embed="rId3"/>
           <a:srcRect l="25612" r="28386"/>
           <a:stretch>
             <a:fillRect/>
@@ -10288,7 +10693,7 @@
           <p:nvPr/>
         </p:nvPicPr>
         <p:blipFill rotWithShape="1">
-          <a:blip r:embed="rId1"/>
+          <a:blip r:embed="rId2"/>
           <a:srcRect l="25612" r="28386"/>
           <a:stretch>
             <a:fillRect/>
@@ -10315,7 +10720,7 @@
           <p:nvPr/>
         </p:nvPicPr>
         <p:blipFill rotWithShape="1">
-          <a:blip r:embed="rId1"/>
+          <a:blip r:embed="rId2"/>
           <a:srcRect l="25612" r="28386"/>
           <a:stretch>
             <a:fillRect/>
@@ -10364,6 +10769,7 @@
           <a:bodyPr lIns="91425" tIns="91425" rIns="91425" bIns="91425" anchor="ctr" anchorCtr="0">
             <a:noAutofit/>
           </a:bodyPr>
+          <a:lstStyle/>
           <a:p>
             <a:pPr lvl="0">
               <a:spcBef>
@@ -10371,6 +10777,7 @@
               </a:spcBef>
               <a:buNone/>
             </a:pPr>
+            <a:endParaRPr/>
           </a:p>
         </p:txBody>
       </p:sp>
@@ -10397,6 +10804,7 @@
           <a:bodyPr lIns="91425" tIns="91425" rIns="91425" bIns="91425" anchor="t" anchorCtr="0">
             <a:noAutofit/>
           </a:bodyPr>
+          <a:lstStyle/>
           <a:p>
             <a:pPr lvl="0" algn="ctr" rtl="0">
               <a:spcBef>
@@ -10412,11 +10820,6 @@
               </a:rPr>
               <a:t>L</a:t>
             </a:r>
-            <a:endParaRPr lang="en-GB" sz="4800" b="1">
-              <a:solidFill>
-                <a:srgbClr val="1155CC"/>
-              </a:solidFill>
-            </a:endParaRPr>
           </a:p>
         </p:txBody>
       </p:sp>
@@ -10592,7 +10995,7 @@
           <p:nvPr/>
         </p:nvPicPr>
         <p:blipFill rotWithShape="1">
-          <a:blip r:embed="rId1"/>
+          <a:blip r:embed="rId2"/>
           <a:srcRect l="25612" r="28386"/>
           <a:stretch>
             <a:fillRect/>
@@ -10635,6 +11038,7 @@
           <a:bodyPr lIns="91425" tIns="91425" rIns="91425" bIns="91425" anchor="t" anchorCtr="0">
             <a:noAutofit/>
           </a:bodyPr>
+          <a:lstStyle/>
           <a:p>
             <a:pPr lvl="0" algn="ctr" rtl="0">
               <a:spcBef>
@@ -10650,11 +11054,6 @@
               </a:rPr>
               <a:t>R</a:t>
             </a:r>
-            <a:endParaRPr lang="en-GB" sz="4800" b="1">
-              <a:solidFill>
-                <a:srgbClr val="CC0000"/>
-              </a:solidFill>
-            </a:endParaRPr>
           </a:p>
         </p:txBody>
       </p:sp>
@@ -10681,6 +11080,7 @@
           <a:bodyPr lIns="91425" tIns="91425" rIns="91425" bIns="91425" anchor="t" anchorCtr="0">
             <a:noAutofit/>
           </a:bodyPr>
+          <a:lstStyle/>
           <a:p>
             <a:pPr lvl="0" algn="ctr" rtl="0">
               <a:spcBef>
@@ -10696,11 +11096,6 @@
               </a:rPr>
               <a:t>L</a:t>
             </a:r>
-            <a:endParaRPr lang="en-GB" sz="4800" b="1">
-              <a:solidFill>
-                <a:srgbClr val="1155CC"/>
-              </a:solidFill>
-            </a:endParaRPr>
           </a:p>
         </p:txBody>
       </p:sp>
@@ -10727,6 +11122,7 @@
           <a:bodyPr lIns="91425" tIns="91425" rIns="91425" bIns="91425" anchor="t" anchorCtr="0">
             <a:noAutofit/>
           </a:bodyPr>
+          <a:lstStyle/>
           <a:p>
             <a:pPr lvl="0" algn="ctr" rtl="0">
               <a:spcBef>
@@ -10742,11 +11138,6 @@
               </a:rPr>
               <a:t>L</a:t>
             </a:r>
-            <a:endParaRPr lang="en-GB" sz="4800" b="1">
-              <a:solidFill>
-                <a:srgbClr val="1155CC"/>
-              </a:solidFill>
-            </a:endParaRPr>
           </a:p>
         </p:txBody>
       </p:sp>
@@ -10773,6 +11164,7 @@
           <a:bodyPr lIns="91425" tIns="91425" rIns="91425" bIns="91425" anchor="t" anchorCtr="0">
             <a:noAutofit/>
           </a:bodyPr>
+          <a:lstStyle/>
           <a:p>
             <a:pPr lvl="0" algn="ctr" rtl="0">
               <a:spcBef>
@@ -10788,11 +11180,6 @@
               </a:rPr>
               <a:t>R</a:t>
             </a:r>
-            <a:endParaRPr lang="en-GB" sz="4800" b="1">
-              <a:solidFill>
-                <a:srgbClr val="CC0000"/>
-              </a:solidFill>
-            </a:endParaRPr>
           </a:p>
         </p:txBody>
       </p:sp>
@@ -10803,7 +11190,7 @@
           <p:nvPr/>
         </p:nvPicPr>
         <p:blipFill rotWithShape="1">
-          <a:blip r:embed="rId2"/>
+          <a:blip r:embed="rId3"/>
           <a:srcRect l="25612" r="28386"/>
           <a:stretch>
             <a:fillRect/>
@@ -10846,6 +11233,7 @@
           <a:bodyPr lIns="91425" tIns="91425" rIns="91425" bIns="91425" anchor="t" anchorCtr="0">
             <a:noAutofit/>
           </a:bodyPr>
+          <a:lstStyle/>
           <a:p>
             <a:pPr lvl="0" algn="ctr" rtl="0">
               <a:spcBef>
@@ -10861,11 +11249,6 @@
               </a:rPr>
               <a:t>L</a:t>
             </a:r>
-            <a:endParaRPr lang="en-GB" sz="4800" b="1">
-              <a:solidFill>
-                <a:srgbClr val="1155CC"/>
-              </a:solidFill>
-            </a:endParaRPr>
           </a:p>
         </p:txBody>
       </p:sp>
@@ -10905,7 +11288,7 @@
           <p:nvPr/>
         </p:nvPicPr>
         <p:blipFill rotWithShape="1">
-          <a:blip r:embed="rId1"/>
+          <a:blip r:embed="rId2"/>
           <a:srcRect l="25612" r="28386"/>
           <a:stretch>
             <a:fillRect/>
@@ -10954,6 +11337,7 @@
           <a:bodyPr lIns="91425" tIns="91425" rIns="91425" bIns="91425" anchor="ctr" anchorCtr="0">
             <a:noAutofit/>
           </a:bodyPr>
+          <a:lstStyle/>
           <a:p>
             <a:pPr lvl="0">
               <a:spcBef>
@@ -10961,6 +11345,7 @@
               </a:spcBef>
               <a:buNone/>
             </a:pPr>
+            <a:endParaRPr/>
           </a:p>
         </p:txBody>
       </p:sp>
@@ -11039,6 +11424,7 @@
           <a:bodyPr lIns="91425" tIns="91425" rIns="91425" bIns="91425" anchor="t" anchorCtr="0">
             <a:noAutofit/>
           </a:bodyPr>
+          <a:lstStyle/>
           <a:p>
             <a:pPr lvl="0" algn="ctr" rtl="0">
               <a:spcBef>
@@ -11054,11 +11440,6 @@
               </a:rPr>
               <a:t>R</a:t>
             </a:r>
-            <a:endParaRPr lang="en-GB" sz="4800" b="1">
-              <a:solidFill>
-                <a:srgbClr val="CC0000"/>
-              </a:solidFill>
-            </a:endParaRPr>
           </a:p>
         </p:txBody>
       </p:sp>
@@ -11151,7 +11532,7 @@
           <p:nvPr/>
         </p:nvPicPr>
         <p:blipFill rotWithShape="1">
-          <a:blip r:embed="rId1"/>
+          <a:blip r:embed="rId2"/>
           <a:srcRect l="25612" r="28386"/>
           <a:stretch>
             <a:fillRect/>
@@ -11194,6 +11575,7 @@
           <a:bodyPr lIns="91425" tIns="91425" rIns="91425" bIns="91425" anchor="t" anchorCtr="0">
             <a:noAutofit/>
           </a:bodyPr>
+          <a:lstStyle/>
           <a:p>
             <a:pPr lvl="0" algn="ctr" rtl="0">
               <a:spcBef>
@@ -11209,11 +11591,6 @@
               </a:rPr>
               <a:t>R</a:t>
             </a:r>
-            <a:endParaRPr lang="en-GB" sz="4800" b="1">
-              <a:solidFill>
-                <a:srgbClr val="CC0000"/>
-              </a:solidFill>
-            </a:endParaRPr>
           </a:p>
         </p:txBody>
       </p:sp>
@@ -11248,6 +11625,7 @@
           <a:bodyPr lIns="91425" tIns="91425" rIns="91425" bIns="91425" anchor="ctr" anchorCtr="0">
             <a:noAutofit/>
           </a:bodyPr>
+          <a:lstStyle/>
           <a:p>
             <a:pPr lvl="0">
               <a:spcBef>
@@ -11255,6 +11633,7 @@
               </a:spcBef>
               <a:buNone/>
             </a:pPr>
+            <a:endParaRPr/>
           </a:p>
         </p:txBody>
       </p:sp>
@@ -11281,6 +11660,7 @@
           <a:bodyPr lIns="91425" tIns="91425" rIns="91425" bIns="91425" anchor="t" anchorCtr="0">
             <a:noAutofit/>
           </a:bodyPr>
+          <a:lstStyle/>
           <a:p>
             <a:pPr lvl="0" algn="ctr" rtl="0">
               <a:spcBef>
@@ -11296,11 +11676,6 @@
               </a:rPr>
               <a:t>Loss</a:t>
             </a:r>
-            <a:endParaRPr lang="en-GB" sz="2400" b="1">
-              <a:solidFill>
-                <a:srgbClr val="6AA84F"/>
-              </a:solidFill>
-            </a:endParaRPr>
           </a:p>
         </p:txBody>
       </p:sp>
@@ -11363,6 +11738,7 @@
           <a:bodyPr lIns="91425" tIns="91425" rIns="91425" bIns="91425" anchor="ctr" anchorCtr="0">
             <a:noAutofit/>
           </a:bodyPr>
+          <a:lstStyle/>
           <a:p>
             <a:pPr lvl="0">
               <a:spcBef>
@@ -11370,6 +11746,7 @@
               </a:spcBef>
               <a:buNone/>
             </a:pPr>
+            <a:endParaRPr/>
           </a:p>
         </p:txBody>
       </p:sp>
@@ -11425,6 +11802,7 @@
           <a:bodyPr lIns="91425" tIns="91425" rIns="91425" bIns="91425" anchor="t" anchorCtr="0">
             <a:noAutofit/>
           </a:bodyPr>
+          <a:lstStyle/>
           <a:p>
             <a:pPr lvl="0" algn="ctr" rtl="0">
               <a:spcBef>
@@ -11440,11 +11818,6 @@
               </a:rPr>
               <a:t>LR Loss</a:t>
             </a:r>
-            <a:endParaRPr lang="en-GB" sz="2400" b="1" dirty="0">
-              <a:solidFill>
-                <a:srgbClr val="6AA84F"/>
-              </a:solidFill>
-            </a:endParaRPr>
           </a:p>
         </p:txBody>
       </p:sp>
@@ -11471,6 +11844,7 @@
           <a:bodyPr lIns="91425" tIns="91425" rIns="91425" bIns="91425" anchor="t" anchorCtr="0">
             <a:noAutofit/>
           </a:bodyPr>
+          <a:lstStyle/>
           <a:p>
             <a:pPr lvl="0" algn="ctr" rtl="0">
               <a:spcBef>
@@ -11486,11 +11860,6 @@
               </a:rPr>
               <a:t>Input</a:t>
             </a:r>
-            <a:endParaRPr lang="en-GB" dirty="0">
-              <a:solidFill>
-                <a:srgbClr val="CCCCCC"/>
-              </a:solidFill>
-            </a:endParaRPr>
           </a:p>
           <a:p>
             <a:pPr lvl="0" algn="ctr" rtl="0">
@@ -11538,6 +11907,7 @@
           <a:bodyPr lIns="91425" tIns="91425" rIns="91425" bIns="91425" anchor="t" anchorCtr="0">
             <a:noAutofit/>
           </a:bodyPr>
+          <a:lstStyle/>
           <a:p>
             <a:pPr lvl="0" algn="ctr" rtl="0">
               <a:spcBef>
@@ -11553,11 +11923,6 @@
               </a:rPr>
               <a:t>CNN</a:t>
             </a:r>
-            <a:endParaRPr lang="en-GB">
-              <a:solidFill>
-                <a:srgbClr val="CCCCCC"/>
-              </a:solidFill>
-            </a:endParaRPr>
           </a:p>
         </p:txBody>
       </p:sp>
@@ -11584,6 +11949,7 @@
           <a:bodyPr lIns="91425" tIns="91425" rIns="91425" bIns="91425" anchor="t" anchorCtr="0">
             <a:noAutofit/>
           </a:bodyPr>
+          <a:lstStyle/>
           <a:p>
             <a:pPr lvl="0" algn="ctr" rtl="0">
               <a:spcBef>
@@ -11599,11 +11965,6 @@
               </a:rPr>
               <a:t>Output</a:t>
             </a:r>
-            <a:endParaRPr lang="en-GB">
-              <a:solidFill>
-                <a:srgbClr val="CCCCCC"/>
-              </a:solidFill>
-            </a:endParaRPr>
           </a:p>
           <a:p>
             <a:pPr lvl="0" algn="ctr" rtl="0">
@@ -11620,11 +11981,6 @@
               </a:rPr>
               <a:t>colors</a:t>
             </a:r>
-            <a:endParaRPr lang="en-GB">
-              <a:solidFill>
-                <a:srgbClr val="CCCCCC"/>
-              </a:solidFill>
-            </a:endParaRPr>
           </a:p>
         </p:txBody>
       </p:sp>
@@ -11651,6 +12007,7 @@
           <a:bodyPr lIns="91425" tIns="91425" rIns="91425" bIns="91425" anchor="t" anchorCtr="0">
             <a:noAutofit/>
           </a:bodyPr>
+          <a:lstStyle/>
           <a:p>
             <a:pPr lvl="0" algn="ctr" rtl="0">
               <a:spcBef>
@@ -11666,11 +12023,6 @@
               </a:rPr>
               <a:t>Target</a:t>
             </a:r>
-            <a:endParaRPr lang="en-GB">
-              <a:solidFill>
-                <a:srgbClr val="CCCCCC"/>
-              </a:solidFill>
-            </a:endParaRPr>
           </a:p>
           <a:p>
             <a:pPr lvl="0" algn="ctr" rtl="0">
@@ -11687,11 +12039,6 @@
               </a:rPr>
               <a:t>colors</a:t>
             </a:r>
-            <a:endParaRPr lang="en-GB">
-              <a:solidFill>
-                <a:srgbClr val="CCCCCC"/>
-              </a:solidFill>
-            </a:endParaRPr>
           </a:p>
         </p:txBody>
       </p:sp>
@@ -11718,6 +12065,7 @@
           <a:bodyPr lIns="91425" tIns="91425" rIns="91425" bIns="91425" anchor="t" anchorCtr="0">
             <a:noAutofit/>
           </a:bodyPr>
+          <a:lstStyle/>
           <a:p>
             <a:pPr lvl="0" algn="ctr" rtl="0">
               <a:spcBef>
@@ -11733,11 +12081,6 @@
               </a:rPr>
               <a:t>Sampler</a:t>
             </a:r>
-            <a:endParaRPr lang="en-GB">
-              <a:solidFill>
-                <a:srgbClr val="CCCCCC"/>
-              </a:solidFill>
-            </a:endParaRPr>
           </a:p>
         </p:txBody>
       </p:sp>
@@ -11749,8 +12092,8 @@
         </p:nvSpPr>
         <p:spPr>
           <a:xfrm>
-            <a:off x="3808407" y="4997385"/>
-            <a:ext cx="998700" cy="390000"/>
+            <a:off x="3566345" y="4997385"/>
+            <a:ext cx="1317338" cy="390000"/>
           </a:xfrm>
           <a:prstGeom prst="rect">
             <a:avLst/>
@@ -11764,6 +12107,7 @@
           <a:bodyPr lIns="91425" tIns="91425" rIns="91425" bIns="91425" anchor="t" anchorCtr="0">
             <a:noAutofit/>
           </a:bodyPr>
+          <a:lstStyle/>
           <a:p>
             <a:pPr lvl="0" algn="ctr" rtl="0">
               <a:spcBef>
@@ -11772,18 +12116,13 @@
               <a:buNone/>
             </a:pPr>
             <a:r>
-              <a:rPr lang="en-GB">
+              <a:rPr lang="en-GB" dirty="0">
                 <a:solidFill>
                   <a:srgbClr val="CCCCCC"/>
                 </a:solidFill>
               </a:rPr>
               <a:t>Output</a:t>
             </a:r>
-            <a:endParaRPr lang="en-GB">
-              <a:solidFill>
-                <a:srgbClr val="CCCCCC"/>
-              </a:solidFill>
-            </a:endParaRPr>
           </a:p>
           <a:p>
             <a:pPr lvl="0" algn="ctr" rtl="0">
@@ -11793,18 +12132,13 @@
               <a:buNone/>
             </a:pPr>
             <a:r>
-              <a:rPr lang="en-GB">
+              <a:rPr lang="en-GB" dirty="0">
                 <a:solidFill>
                   <a:srgbClr val="CCCCCC"/>
                 </a:solidFill>
               </a:rPr>
               <a:t>disparities</a:t>
             </a:r>
-            <a:endParaRPr lang="en-GB">
-              <a:solidFill>
-                <a:srgbClr val="CCCCCC"/>
-              </a:solidFill>
-            </a:endParaRPr>
           </a:p>
         </p:txBody>
       </p:sp>
@@ -11935,6 +12269,7 @@
             </a:pPr>
             <a:fld id="{00000000-1234-1234-1234-123412341234}" type="slidenum">
               <a:rPr lang="en-GB" smtClean="0"/>
+              <a:t>8</a:t>
             </a:fld>
             <a:endParaRPr lang="en-GB"/>
           </a:p>
@@ -12035,6 +12370,7 @@
           <a:bodyPr lIns="91425" tIns="91425" rIns="91425" bIns="91425" anchor="t" anchorCtr="0">
             <a:noAutofit/>
           </a:bodyPr>
+          <a:lstStyle/>
           <a:p>
             <a:pPr lvl="0" algn="ctr" rtl="0">
               <a:spcBef>
@@ -12050,11 +12386,6 @@
               </a:rPr>
               <a:t>used for training</a:t>
             </a:r>
-            <a:endParaRPr lang="en-US" altLang="en-GB" sz="2000" b="1" dirty="0">
-              <a:solidFill>
-                <a:schemeClr val="accent2"/>
-              </a:solidFill>
-            </a:endParaRPr>
           </a:p>
         </p:txBody>
       </p:sp>
@@ -13513,7 +13844,6 @@
               <a:rPr lang="en-US"/>
               <a:t>concept</a:t>
             </a:r>
-            <a:endParaRPr lang="en-US"/>
           </a:p>
         </p:txBody>
       </p:sp>
@@ -13527,12 +13857,87 @@
             <p:ph idx="1"/>
           </p:nvPr>
         </p:nvSpPr>
-        <p:spPr/>
+        <p:spPr>
+          <a:xfrm>
+            <a:off x="360000" y="1620000"/>
+            <a:ext cx="8676496" cy="4479943"/>
+          </a:xfrm>
+        </p:spPr>
         <p:txBody>
           <a:bodyPr/>
           <a:lstStyle/>
           <a:p>
-            <a:endParaRPr lang="en-US"/>
+            <a:pPr marL="342900" indent="-342900">
+              <a:buFont typeface="Arial" panose="020B0604020202020204" pitchFamily="34" charset="0"/>
+              <a:buChar char="•"/>
+            </a:pPr>
+            <a:r>
+              <a:rPr lang="en-US" dirty="0" smtClean="0"/>
+              <a:t>CCN that learns to perform single depth estimation despite the absence of </a:t>
+            </a:r>
+            <a:r>
+              <a:rPr lang="en-US" dirty="0" err="1" smtClean="0"/>
+              <a:t>groundtruth</a:t>
+            </a:r>
+            <a:r>
+              <a:rPr lang="en-US" dirty="0" smtClean="0"/>
+              <a:t> depth data</a:t>
+            </a:r>
+          </a:p>
+          <a:p>
+            <a:pPr marL="342900" indent="-342900">
+              <a:buFont typeface="Arial" panose="020B0604020202020204" pitchFamily="34" charset="0"/>
+              <a:buChar char="•"/>
+            </a:pPr>
+            <a:r>
+              <a:rPr lang="en-US" dirty="0" smtClean="0"/>
+              <a:t>It learns to predict pixel-level correspondence between pairs of rectified stereo images that have known camera baseline</a:t>
+            </a:r>
+            <a:endParaRPr lang="en-US" dirty="0" smtClean="0"/>
+          </a:p>
+          <a:p>
+            <a:pPr marL="342900" indent="-342900">
+              <a:buFont typeface="Arial" panose="020B0604020202020204" pitchFamily="34" charset="0"/>
+              <a:buChar char="•"/>
+            </a:pPr>
+            <a:r>
+              <a:rPr lang="en-US" dirty="0" smtClean="0"/>
+              <a:t>Training loss that enforces left-right depth consistency inside the network</a:t>
+            </a:r>
+            <a:endParaRPr lang="en-US" dirty="0" smtClean="0"/>
+          </a:p>
+          <a:p>
+            <a:pPr marL="342900" indent="-342900">
+              <a:buFont typeface="Arial" panose="020B0604020202020204" pitchFamily="34" charset="0"/>
+              <a:buChar char="•"/>
+            </a:pPr>
+            <a:r>
+              <a:rPr lang="en-US" dirty="0" smtClean="0"/>
+              <a:t>Code available for </a:t>
+            </a:r>
+            <a:r>
+              <a:rPr lang="en-US" dirty="0" err="1" smtClean="0"/>
+              <a:t>TensorFlow</a:t>
+            </a:r>
+            <a:endParaRPr lang="en-US" dirty="0" smtClean="0"/>
+          </a:p>
+          <a:p>
+            <a:pPr marL="342900" indent="-342900">
+              <a:buFont typeface="Arial" panose="020B0604020202020204" pitchFamily="34" charset="0"/>
+              <a:buChar char="•"/>
+            </a:pPr>
+            <a:r>
+              <a:rPr lang="en-US" dirty="0" smtClean="0"/>
+              <a:t>Evaluated on KITTI</a:t>
+            </a:r>
+            <a:endParaRPr lang="en-US" dirty="0" smtClean="0"/>
+          </a:p>
+          <a:p>
+            <a:pPr marL="342900" indent="-342900">
+              <a:buFont typeface="Arial" panose="020B0604020202020204" pitchFamily="34" charset="0"/>
+              <a:buChar char="•"/>
+            </a:pPr>
+            <a:endParaRPr lang="en-US" dirty="0"/>
           </a:p>
         </p:txBody>
       </p:sp>
@@ -13764,6 +14169,7 @@
       </a:bgFillStyleLst>
     </a:fmtScheme>
   </a:themeElements>
+  <a:objectDefaults/>
   <a:extraClrSchemeLst>
     <a:extraClrScheme>
       <a:clrScheme name="v1_TUD_Präsentation_rot 1">
@@ -14544,6 +14950,8 @@
       </a:bgFillStyleLst>
     </a:fmtScheme>
   </a:themeElements>
+  <a:objectDefaults/>
+  <a:extraClrSchemeLst/>
   <a:extLst>
     <a:ext uri="{05A4C25C-085E-4340-85A3-A5531E510DB2}">
       <thm15:themeFamily xmlns:thm15="http://schemas.microsoft.com/office/thememl/2012/main" name="Office Theme" id="{62F939B6-93AF-4DB8-9C6B-D6C7DFDC589F}" vid="{4A3C46E8-61CC-4603-A589-7422A47A8E4A}"/>
@@ -14830,6 +15238,8 @@
       </a:bgFillStyleLst>
     </a:fmtScheme>
   </a:themeElements>
+  <a:objectDefaults/>
+  <a:extraClrSchemeLst/>
   <a:extLst>
     <a:ext uri="{05A4C25C-085E-4340-85A3-A5531E510DB2}">
       <thm15:themeFamily xmlns:thm15="http://schemas.microsoft.com/office/thememl/2012/main" name="Office Theme" id="{62F939B6-93AF-4DB8-9C6B-D6C7DFDC589F}" vid="{4A3C46E8-61CC-4603-A589-7422A47A8E4A}"/>

</xml_diff>